<commit_message>
various changes (as per the timeline)
</commit_message>
<xml_diff>
--- a/final/Discussion_paper.pptx
+++ b/final/Discussion_paper.pptx
@@ -289,7 +289,7 @@
           <a:p>
             <a:fld id="{BCDB334D-D17F-49C4-91DD-37BB7E818209}" type="datetimeFigureOut">
               <a:rPr lang="de-CH" smtClean="0"/>
-              <a:t>25.11.2022</a:t>
+              <a:t>27.11.2022</a:t>
             </a:fld>
             <a:endParaRPr lang="de-CH"/>
           </a:p>
@@ -714,7 +714,7 @@
           <a:p>
             <a:fld id="{3CF37669-2BCF-46DA-B042-E354827809F7}" type="datetime1">
               <a:rPr lang="de-DE" smtClean="0"/>
-              <a:t>25.11.2022</a:t>
+              <a:t>27.11.2022</a:t>
             </a:fld>
             <a:endParaRPr lang="de-DE"/>
           </a:p>
@@ -943,7 +943,7 @@
           <a:p>
             <a:fld id="{DD0AF57A-3629-4D20-9CDE-C9CA7A3667AA}" type="datetime1">
               <a:rPr lang="de-DE" smtClean="0"/>
-              <a:t>25.11.2022</a:t>
+              <a:t>27.11.2022</a:t>
             </a:fld>
             <a:endParaRPr lang="de-DE"/>
           </a:p>
@@ -1215,7 +1215,7 @@
           <a:p>
             <a:fld id="{A02690AB-37C5-464E-B999-AEA04CFF82B9}" type="datetime1">
               <a:rPr lang="de-DE" smtClean="0"/>
-              <a:t>25.11.2022</a:t>
+              <a:t>27.11.2022</a:t>
             </a:fld>
             <a:endParaRPr lang="de-DE" dirty="0"/>
           </a:p>
@@ -1524,7 +1524,7 @@
           <a:p>
             <a:fld id="{D6387CFC-9D6A-4A2B-A4A9-D1A02656E42F}" type="datetime1">
               <a:rPr lang="de-DE" smtClean="0"/>
-              <a:t>25.11.2022</a:t>
+              <a:t>27.11.2022</a:t>
             </a:fld>
             <a:endParaRPr lang="de-DE"/>
           </a:p>
@@ -2128,7 +2128,7 @@
           <a:p>
             <a:fld id="{FF15E650-2C9B-4E22-B544-79A90AB3DDC1}" type="datetime1">
               <a:rPr lang="de-DE" smtClean="0"/>
-              <a:t>25.11.2022</a:t>
+              <a:t>27.11.2022</a:t>
             </a:fld>
             <a:endParaRPr lang="de-DE"/>
           </a:p>
@@ -2461,7 +2461,7 @@
           <a:p>
             <a:fld id="{61621C89-5216-48C0-BC08-43A5D37DC60A}" type="datetime1">
               <a:rPr lang="de-DE" smtClean="0"/>
-              <a:t>25.11.2022</a:t>
+              <a:t>27.11.2022</a:t>
             </a:fld>
             <a:endParaRPr lang="de-DE"/>
           </a:p>
@@ -2585,7 +2585,7 @@
           <a:p>
             <a:fld id="{F1FF226D-F83D-4818-9860-D08642397BB7}" type="datetime1">
               <a:rPr lang="de-DE" smtClean="0"/>
-              <a:t>25.11.2022</a:t>
+              <a:t>27.11.2022</a:t>
             </a:fld>
             <a:endParaRPr lang="de-DE"/>
           </a:p>
@@ -2712,7 +2712,7 @@
           <a:p>
             <a:fld id="{A5F31C7A-EA54-4BF4-ACB0-2765243AF525}" type="datetime1">
               <a:rPr lang="de-DE" smtClean="0"/>
-              <a:t>25.11.2022</a:t>
+              <a:t>27.11.2022</a:t>
             </a:fld>
             <a:endParaRPr lang="de-DE"/>
           </a:p>
@@ -2855,7 +2855,7 @@
           <a:p>
             <a:fld id="{EFD419F0-1738-4192-8FF2-BE957FD32662}" type="datetime1">
               <a:rPr lang="de-DE" smtClean="0"/>
-              <a:t>25.11.2022</a:t>
+              <a:t>27.11.2022</a:t>
             </a:fld>
             <a:endParaRPr lang="de-DE"/>
           </a:p>
@@ -3253,7 +3253,7 @@
           <a:p>
             <a:fld id="{D78D58C2-FBCE-4B47-BBAC-2891E9120B14}" type="datetime1">
               <a:rPr lang="de-DE" smtClean="0"/>
-              <a:t>25.11.2022</a:t>
+              <a:t>27.11.2022</a:t>
             </a:fld>
             <a:endParaRPr lang="de-DE" dirty="0"/>
           </a:p>
@@ -3923,7 +3923,7 @@
           <a:p>
             <a:fld id="{3CF37669-2BCF-46DA-B042-E354827809F7}" type="datetime1">
               <a:rPr lang="de-DE" smtClean="0"/>
-              <a:t>25.11.2022</a:t>
+              <a:t>27.11.2022</a:t>
             </a:fld>
             <a:endParaRPr lang="de-DE"/>
           </a:p>
@@ -4084,7 +4084,7 @@
           <a:p>
             <a:fld id="{FF15E650-2C9B-4E22-B544-79A90AB3DDC1}" type="datetime1">
               <a:rPr lang="de-DE" smtClean="0"/>
-              <a:t>25.11.2022</a:t>
+              <a:t>27.11.2022</a:t>
             </a:fld>
             <a:endParaRPr lang="de-DE"/>
           </a:p>
@@ -4214,7 +4214,7 @@
           <a:p>
             <a:fld id="{FF15E650-2C9B-4E22-B544-79A90AB3DDC1}" type="datetime1">
               <a:rPr lang="de-DE" smtClean="0"/>
-              <a:t>25.11.2022</a:t>
+              <a:t>27.11.2022</a:t>
             </a:fld>
             <a:endParaRPr lang="de-DE"/>
           </a:p>
@@ -4316,7 +4316,7 @@
           <a:p>
             <a:fld id="{FF15E650-2C9B-4E22-B544-79A90AB3DDC1}" type="datetime1">
               <a:rPr lang="de-DE" smtClean="0"/>
-              <a:t>25.11.2022</a:t>
+              <a:t>27.11.2022</a:t>
             </a:fld>
             <a:endParaRPr lang="de-DE"/>
           </a:p>
@@ -4515,7 +4515,7 @@
           <a:p>
             <a:fld id="{FF15E650-2C9B-4E22-B544-79A90AB3DDC1}" type="datetime1">
               <a:rPr lang="de-DE" smtClean="0"/>
-              <a:t>25.11.2022</a:t>
+              <a:t>27.11.2022</a:t>
             </a:fld>
             <a:endParaRPr lang="de-DE"/>
           </a:p>
@@ -4633,14 +4633,14 @@
             <p:ph idx="1"/>
             <p:extLst>
               <p:ext uri="{D42A27DB-BD31-4B8C-83A1-F6EECF244321}">
-                <p14:modId xmlns:p14="http://schemas.microsoft.com/office/powerpoint/2010/main" val="3073733607"/>
+                <p14:modId xmlns:p14="http://schemas.microsoft.com/office/powerpoint/2010/main" val="420972061"/>
               </p:ext>
             </p:extLst>
           </p:nvPr>
         </p:nvGraphicFramePr>
         <p:xfrm>
           <a:off x="396751" y="1290446"/>
-          <a:ext cx="8496300" cy="5095240"/>
+          <a:ext cx="8496300" cy="5308600"/>
         </p:xfrm>
         <a:graphic>
           <a:graphicData uri="http://schemas.openxmlformats.org/drawingml/2006/table">
@@ -4780,7 +4780,11 @@
                       </a:r>
                     </a:p>
                   </a:txBody>
-                  <a:tcPr/>
+                  <a:tcPr>
+                    <a:solidFill>
+                      <a:srgbClr val="92D050"/>
+                    </a:solidFill>
+                  </a:tcPr>
                 </a:tc>
                 <a:tc>
                   <a:txBody>
@@ -4830,7 +4834,7 @@
                       </a:r>
                       <a:r>
                         <a:rPr lang="en-US" sz="1400" baseline="0" dirty="0" smtClean="0"/>
-                        <a:t>6 Nov</a:t>
+                        <a:t>7 Nov</a:t>
                       </a:r>
                       <a:endParaRPr lang="en-US" sz="1400" dirty="0"/>
                     </a:p>
@@ -4870,48 +4874,12 @@
                         <a:defRPr/>
                       </a:pPr>
                       <a:r>
-                        <a:rPr lang="en-US" sz="1400" baseline="0" dirty="0" smtClean="0"/>
-                        <a:t>Move SI to excel </a:t>
-                      </a:r>
-                      <a:endParaRPr lang="en-US" sz="1400" dirty="0" smtClean="0"/>
-                    </a:p>
-                    <a:p>
-                      <a:pPr marL="285750" marR="0" lvl="0" indent="-285750" algn="l" defTabSz="914400" rtl="0" eaLnBrk="1" fontAlgn="auto" latinLnBrk="0" hangingPunct="1">
-                        <a:lnSpc>
-                          <a:spcPct val="100000"/>
-                        </a:lnSpc>
-                        <a:spcBef>
-                          <a:spcPts val="0"/>
-                        </a:spcBef>
-                        <a:spcAft>
-                          <a:spcPts val="0"/>
-                        </a:spcAft>
-                        <a:buClrTx/>
-                        <a:buSzTx/>
-                        <a:buFontTx/>
-                        <a:buChar char="-"/>
-                        <a:tabLst/>
-                        <a:defRPr/>
-                      </a:pPr>
-                      <a:r>
                         <a:rPr lang="en-US" sz="1400" dirty="0" smtClean="0"/>
-                        <a:t>Write </a:t>
-                      </a:r>
-                      <a:r>
-                        <a:rPr lang="en-US" sz="1400" dirty="0" smtClean="0"/>
-                        <a:t>Section</a:t>
+                        <a:t>Write Section</a:t>
                       </a:r>
                       <a:r>
                         <a:rPr lang="en-US" sz="1400" baseline="0" dirty="0" smtClean="0"/>
-                        <a:t> </a:t>
-                      </a:r>
-                      <a:r>
-                        <a:rPr lang="en-US" sz="1400" baseline="0" dirty="0" smtClean="0"/>
-                        <a:t>2.2. </a:t>
-                      </a:r>
-                      <a:r>
-                        <a:rPr lang="en-US" sz="1400" baseline="0" dirty="0" smtClean="0"/>
-                        <a:t>Model (Explain Figure 1)</a:t>
+                        <a:t> 2.2. Model (Explain Figure 1)</a:t>
                       </a:r>
                     </a:p>
                     <a:p>
@@ -4946,15 +4914,7 @@
                       </a:r>
                       <a:r>
                         <a:rPr lang="en-US" sz="1400" baseline="0" dirty="0" smtClean="0"/>
-                        <a:t> </a:t>
-                      </a:r>
-                      <a:r>
-                        <a:rPr lang="en-US" sz="1400" baseline="0" dirty="0" smtClean="0"/>
-                        <a:t>2.2.1 </a:t>
-                      </a:r>
-                      <a:r>
-                        <a:rPr lang="en-US" sz="1400" baseline="0" dirty="0" smtClean="0"/>
-                        <a:t>Process User Inputs</a:t>
+                        <a:t> 2.2.1 Process User Inputs</a:t>
                       </a:r>
                     </a:p>
                     <a:p>
@@ -4977,38 +4937,7 @@
                       </a:pPr>
                       <a:r>
                         <a:rPr lang="en-US" sz="1400" baseline="0" dirty="0" smtClean="0"/>
-                        <a:t>Fix Table </a:t>
-                      </a:r>
-                      <a:r>
-                        <a:rPr lang="en-US" sz="1400" baseline="0" dirty="0" smtClean="0"/>
-                        <a:t>2</a:t>
-                      </a:r>
-                    </a:p>
-                    <a:p>
-                      <a:pPr marL="285750" marR="0" lvl="0" indent="-285750" algn="l" defTabSz="914400" rtl="0" eaLnBrk="1" fontAlgn="auto" latinLnBrk="0" hangingPunct="1">
-                        <a:lnSpc>
-                          <a:spcPct val="100000"/>
-                        </a:lnSpc>
-                        <a:spcBef>
-                          <a:spcPts val="0"/>
-                        </a:spcBef>
-                        <a:spcAft>
-                          <a:spcPts val="0"/>
-                        </a:spcAft>
-                        <a:buClrTx/>
-                        <a:buSzTx/>
-                        <a:buFontTx/>
-                        <a:buChar char="-"/>
-                        <a:tabLst/>
-                        <a:defRPr/>
-                      </a:pPr>
-                      <a:r>
-                        <a:rPr lang="en-US" sz="1400" dirty="0" smtClean="0"/>
-                        <a:t>Write</a:t>
-                      </a:r>
-                      <a:r>
-                        <a:rPr lang="en-US" sz="1400" baseline="0" dirty="0" smtClean="0"/>
-                        <a:t> Section 2.2.2. Calculate U Values </a:t>
+                        <a:t>Fix Table 2</a:t>
                       </a:r>
                     </a:p>
                     <a:p>
@@ -5031,6 +4960,53 @@
                       </a:pPr>
                       <a:r>
                         <a:rPr lang="en-US" sz="1400" baseline="0" dirty="0" smtClean="0"/>
+                        <a:t>Check figure 2 and improve with all buildings</a:t>
+                      </a:r>
+                    </a:p>
+                    <a:p>
+                      <a:pPr marL="285750" marR="0" lvl="0" indent="-285750" algn="l" defTabSz="914400" rtl="0" eaLnBrk="1" fontAlgn="auto" latinLnBrk="0" hangingPunct="1">
+                        <a:lnSpc>
+                          <a:spcPct val="100000"/>
+                        </a:lnSpc>
+                        <a:spcBef>
+                          <a:spcPts val="0"/>
+                        </a:spcBef>
+                        <a:spcAft>
+                          <a:spcPts val="0"/>
+                        </a:spcAft>
+                        <a:buClrTx/>
+                        <a:buSzTx/>
+                        <a:buFontTx/>
+                        <a:buChar char="-"/>
+                        <a:tabLst/>
+                        <a:defRPr/>
+                      </a:pPr>
+                      <a:r>
+                        <a:rPr lang="en-US" sz="1400" baseline="0" dirty="0" smtClean="0"/>
+                        <a:t>Work on the model: string to integer table fix columns</a:t>
+                      </a:r>
+                      <a:endParaRPr lang="en-US" sz="1400" baseline="0" dirty="0" smtClean="0"/>
+                    </a:p>
+                    <a:p>
+                      <a:pPr marL="285750" marR="0" lvl="0" indent="-285750" algn="l" defTabSz="914400" rtl="0" eaLnBrk="1" fontAlgn="auto" latinLnBrk="0" hangingPunct="1">
+                        <a:lnSpc>
+                          <a:spcPct val="100000"/>
+                        </a:lnSpc>
+                        <a:spcBef>
+                          <a:spcPts val="0"/>
+                        </a:spcBef>
+                        <a:spcAft>
+                          <a:spcPts val="0"/>
+                        </a:spcAft>
+                        <a:buClrTx/>
+                        <a:buSzTx/>
+                        <a:buFontTx/>
+                        <a:buChar char="-"/>
+                        <a:tabLst/>
+                        <a:defRPr/>
+                      </a:pPr>
+                      <a:r>
+                        <a:rPr lang="en-US" sz="1400" strike="sngStrike" baseline="0" dirty="0" smtClean="0"/>
                         <a:t>Check, maybe remove Table 3 </a:t>
                       </a:r>
                     </a:p>
@@ -5054,7 +5030,7 @@
                       </a:pPr>
                       <a:r>
                         <a:rPr lang="en-US" sz="1400" baseline="0" dirty="0" smtClean="0"/>
-                        <a:t>Check figure 2 and improve with all buildings</a:t>
+                        <a:t>Move SI to excel </a:t>
                       </a:r>
                     </a:p>
                   </a:txBody>
@@ -5149,21 +5125,35 @@
                       </a:r>
                       <a:r>
                         <a:rPr lang="en-US" sz="1400" baseline="0" dirty="0" smtClean="0"/>
-                        <a:t> </a:t>
+                        <a:t> Section 2.2.2. Calculate U Values </a:t>
+                      </a:r>
+                    </a:p>
+                    <a:p>
+                      <a:pPr marL="285750" marR="0" lvl="0" indent="-285750" algn="l" defTabSz="914400" rtl="0" eaLnBrk="1" fontAlgn="auto" latinLnBrk="0" hangingPunct="1">
+                        <a:lnSpc>
+                          <a:spcPct val="100000"/>
+                        </a:lnSpc>
+                        <a:spcBef>
+                          <a:spcPts val="0"/>
+                        </a:spcBef>
+                        <a:spcAft>
+                          <a:spcPts val="0"/>
+                        </a:spcAft>
+                        <a:buClrTx/>
+                        <a:buSzTx/>
+                        <a:buFontTx/>
+                        <a:buChar char="-"/>
+                        <a:tabLst/>
+                        <a:defRPr/>
+                      </a:pPr>
+                      <a:r>
+                        <a:rPr lang="en-US" sz="1400" dirty="0" smtClean="0"/>
+                        <a:t>Write</a:t>
                       </a:r>
                       <a:r>
                         <a:rPr lang="en-US" sz="1400" baseline="0" dirty="0" smtClean="0"/>
-                        <a:t>Section </a:t>
+                        <a:t> Section 2.2.3. Calculate Space heating </a:t>
                       </a:r>
-                      <a:r>
-                        <a:rPr lang="en-US" sz="1400" baseline="0" dirty="0" smtClean="0"/>
-                        <a:t>2.2.3</a:t>
-                      </a:r>
-                      <a:r>
-                        <a:rPr lang="en-US" sz="1400" baseline="0" dirty="0" smtClean="0"/>
-                        <a:t>. Calculate Space heating </a:t>
-                      </a:r>
-                      <a:endParaRPr lang="en-US" sz="1400" baseline="0" dirty="0" smtClean="0"/>
                     </a:p>
                     <a:p>
                       <a:pPr marL="285750" marR="0" lvl="0" indent="-285750" algn="l" defTabSz="914400" rtl="0" eaLnBrk="1" fontAlgn="auto" latinLnBrk="0" hangingPunct="1">
@@ -5243,9 +5233,8 @@
                       </a:pPr>
                       <a:r>
                         <a:rPr lang="en-US" sz="1400" baseline="0" dirty="0" smtClean="0"/>
-                        <a:t>Meeting Rene </a:t>
+                        <a:t>Meeting Rene (discuss final results)</a:t>
                       </a:r>
-                      <a:endParaRPr lang="en-US" sz="1400" baseline="0" dirty="0" smtClean="0"/>
                     </a:p>
                   </a:txBody>
                   <a:tcPr>
@@ -5277,11 +5266,7 @@
                       </a:r>
                       <a:r>
                         <a:rPr lang="en-US" sz="1400" baseline="0" dirty="0" smtClean="0"/>
-                        <a:t> on Section 2.2, Section </a:t>
-                      </a:r>
-                      <a:r>
-                        <a:rPr lang="en-US" sz="1400" baseline="0" dirty="0" smtClean="0"/>
-                        <a:t>2.2.1 , 2.2.2</a:t>
+                        <a:t> on Section 2.2, Section 2.2.1 , 2.2.2</a:t>
                       </a:r>
                       <a:endParaRPr lang="en-US" sz="1400" dirty="0"/>
                     </a:p>
@@ -5403,19 +5388,11 @@
                     <a:p>
                       <a:r>
                         <a:rPr lang="en-US" sz="1400" dirty="0" smtClean="0"/>
-                        <a:t>Sasha checks </a:t>
-                      </a:r>
-                      <a:r>
-                        <a:rPr lang="en-US" sz="1400" dirty="0" smtClean="0"/>
-                        <a:t>2.2.3</a:t>
+                        <a:t>Sasha checks 2.2.3</a:t>
                       </a:r>
                       <a:r>
                         <a:rPr lang="en-US" sz="1400" baseline="0" dirty="0" smtClean="0"/>
-                        <a:t> </a:t>
-                      </a:r>
-                      <a:r>
-                        <a:rPr lang="en-US" sz="1400" baseline="0" dirty="0" smtClean="0"/>
-                        <a:t>and discuss model ( u value, heat demand) </a:t>
+                        <a:t> and discuss model ( u value, heat demand) </a:t>
                       </a:r>
                       <a:endParaRPr lang="en-US" sz="1400" dirty="0"/>
                     </a:p>
@@ -5454,19 +5431,7 @@
                       </a:pPr>
                       <a:r>
                         <a:rPr lang="en-US" sz="1400" baseline="0" dirty="0" smtClean="0"/>
-                        <a:t>Check </a:t>
-                      </a:r>
-                      <a:r>
-                        <a:rPr lang="en-US" sz="1400" baseline="0" dirty="0" smtClean="0"/>
-                        <a:t>LCA calculations (KBOB sources) and adapt section </a:t>
-                      </a:r>
-                      <a:r>
-                        <a:rPr lang="en-US" sz="1400" baseline="0" dirty="0" smtClean="0"/>
-                        <a:t>2.2.4 </a:t>
-                      </a:r>
-                      <a:r>
-                        <a:rPr lang="en-US" sz="1400" baseline="0" dirty="0" smtClean="0"/>
-                        <a:t>writing (if needed)</a:t>
+                        <a:t>Check LCA calculations (KBOB sources) and adapt section 2.2.4 writing (if needed)</a:t>
                       </a:r>
                     </a:p>
                     <a:p>
@@ -5476,13 +5441,8 @@
                       </a:pPr>
                       <a:r>
                         <a:rPr lang="en-US" sz="1400" baseline="0" dirty="0" smtClean="0"/>
-                        <a:t>Check Figure </a:t>
+                        <a:t>Check Figure 4 and add operational and embodied emissions</a:t>
                       </a:r>
-                      <a:r>
-                        <a:rPr lang="en-US" sz="1400" baseline="0" dirty="0" smtClean="0"/>
-                        <a:t>4 and add operational and embodied emissions</a:t>
-                      </a:r>
-                      <a:endParaRPr lang="en-US" sz="1400" baseline="0" dirty="0" smtClean="0"/>
                     </a:p>
                   </a:txBody>
                   <a:tcPr/>
@@ -5494,15 +5454,7 @@
                     <a:p>
                       <a:r>
                         <a:rPr lang="en-US" sz="1400" dirty="0" smtClean="0"/>
-                        <a:t>Sasha checks and discuss </a:t>
-                      </a:r>
-                      <a:r>
-                        <a:rPr lang="en-US" sz="1400" dirty="0" smtClean="0"/>
-                        <a:t>2.2.4 </a:t>
-                      </a:r>
-                      <a:r>
-                        <a:rPr lang="en-US" sz="1400" dirty="0" smtClean="0"/>
-                        <a:t>(LCA)</a:t>
+                        <a:t>Sasha checks and discuss 2.2.4 (LCA)</a:t>
                       </a:r>
                       <a:endParaRPr lang="en-US" sz="1400" dirty="0"/>
                     </a:p>
@@ -5536,7 +5488,7 @@
           <a:p>
             <a:fld id="{A02690AB-37C5-464E-B999-AEA04CFF82B9}" type="datetime1">
               <a:rPr lang="de-DE" smtClean="0"/>
-              <a:t>25.11.2022</a:t>
+              <a:t>27.11.2022</a:t>
             </a:fld>
             <a:endParaRPr lang="de-DE" dirty="0"/>
           </a:p>
@@ -5666,7 +5618,7 @@
           <a:p>
             <a:fld id="{FF15E650-2C9B-4E22-B544-79A90AB3DDC1}" type="datetime1">
               <a:rPr lang="de-DE" smtClean="0"/>
-              <a:t>25.11.2022</a:t>
+              <a:t>27.11.2022</a:t>
             </a:fld>
             <a:endParaRPr lang="de-DE"/>
           </a:p>
@@ -5879,15 +5831,7 @@
                       </a:pPr>
                       <a:r>
                         <a:rPr lang="en-US" sz="1400" baseline="0" dirty="0" smtClean="0"/>
-                        <a:t>Write Section </a:t>
-                      </a:r>
-                      <a:r>
-                        <a:rPr lang="en-US" sz="1400" baseline="0" dirty="0" smtClean="0"/>
-                        <a:t>2.2.5</a:t>
-                      </a:r>
-                      <a:r>
-                        <a:rPr lang="en-US" sz="1400" baseline="0" dirty="0" smtClean="0"/>
-                        <a:t>. Scenario assessment </a:t>
+                        <a:t>Write Section 2.2.5. Scenario assessment </a:t>
                       </a:r>
                     </a:p>
                     <a:p>
@@ -5897,13 +5841,8 @@
                       </a:pPr>
                       <a:r>
                         <a:rPr lang="en-US" sz="1400" baseline="0" dirty="0" smtClean="0"/>
-                        <a:t>Check Table </a:t>
+                        <a:t>Check Table 4</a:t>
                       </a:r>
-                      <a:r>
-                        <a:rPr lang="en-US" sz="1400" baseline="0" dirty="0" smtClean="0"/>
-                        <a:t>4</a:t>
-                      </a:r>
-                      <a:endParaRPr lang="en-US" sz="1400" baseline="0" dirty="0" smtClean="0"/>
                     </a:p>
                     <a:p>
                       <a:pPr marL="285750" indent="-285750">
@@ -5935,11 +5874,7 @@
                     <a:p>
                       <a:r>
                         <a:rPr lang="en-US" sz="1400" dirty="0" smtClean="0"/>
-                        <a:t>Sasha checks </a:t>
-                      </a:r>
-                      <a:r>
-                        <a:rPr lang="en-US" sz="1400" dirty="0" smtClean="0"/>
-                        <a:t>2.2.5</a:t>
+                        <a:t>Sasha checks 2.2.5</a:t>
                       </a:r>
                       <a:endParaRPr lang="en-US" sz="1400" dirty="0"/>
                     </a:p>
@@ -6009,11 +5944,7 @@
                       </a:pPr>
                       <a:r>
                         <a:rPr lang="en-US" sz="1400" baseline="0" dirty="0" smtClean="0"/>
-                        <a:t>Write </a:t>
-                      </a:r>
-                      <a:r>
-                        <a:rPr lang="en-US" sz="1400" baseline="0" dirty="0" smtClean="0"/>
-                        <a:t>Section 2 Methodology intro </a:t>
+                        <a:t>Write Section 2 Methodology intro </a:t>
                       </a:r>
                       <a:endParaRPr lang="en-US" sz="1400" baseline="0" dirty="0"/>
                     </a:p>
@@ -6042,11 +5973,7 @@
                     <a:p>
                       <a:r>
                         <a:rPr lang="en-US" sz="1400" dirty="0" smtClean="0"/>
-                        <a:t>Work </a:t>
-                      </a:r>
-                      <a:r>
-                        <a:rPr lang="en-US" sz="1400" dirty="0" smtClean="0"/>
-                        <a:t>and review together </a:t>
+                        <a:t>Work and review together </a:t>
                       </a:r>
                       <a:endParaRPr lang="en-US" sz="1400" dirty="0"/>
                     </a:p>
@@ -7043,7 +6970,7 @@
           <a:p>
             <a:fld id="{FF15E650-2C9B-4E22-B544-79A90AB3DDC1}" type="datetime1">
               <a:rPr lang="de-DE" smtClean="0"/>
-              <a:t>25.11.2022</a:t>
+              <a:t>27.11.2022</a:t>
             </a:fld>
             <a:endParaRPr lang="de-DE"/>
           </a:p>
@@ -7223,7 +7150,7 @@
           <a:p>
             <a:fld id="{FF15E650-2C9B-4E22-B544-79A90AB3DDC1}" type="datetime1">
               <a:rPr lang="de-DE" smtClean="0"/>
-              <a:t>25.11.2022</a:t>
+              <a:t>27.11.2022</a:t>
             </a:fld>
             <a:endParaRPr lang="de-DE"/>
           </a:p>
@@ -7389,7 +7316,7 @@
           <a:p>
             <a:fld id="{FF15E650-2C9B-4E22-B544-79A90AB3DDC1}" type="datetime1">
               <a:rPr lang="de-DE" smtClean="0"/>
-              <a:t>25.11.2022</a:t>
+              <a:t>27.11.2022</a:t>
             </a:fld>
             <a:endParaRPr lang="de-DE"/>
           </a:p>
@@ -7618,7 +7545,7 @@
           <a:p>
             <a:fld id="{FF15E650-2C9B-4E22-B544-79A90AB3DDC1}" type="datetime1">
               <a:rPr lang="de-DE" smtClean="0"/>
-              <a:t>25.11.2022</a:t>
+              <a:t>27.11.2022</a:t>
             </a:fld>
             <a:endParaRPr lang="de-DE"/>
           </a:p>
@@ -7964,7 +7891,7 @@
           <a:p>
             <a:fld id="{FF15E650-2C9B-4E22-B544-79A90AB3DDC1}" type="datetime1">
               <a:rPr lang="de-DE" smtClean="0"/>
-              <a:t>25.11.2022</a:t>
+              <a:t>27.11.2022</a:t>
             </a:fld>
             <a:endParaRPr lang="de-DE"/>
           </a:p>
@@ -8141,7 +8068,7 @@
           <a:p>
             <a:fld id="{FF15E650-2C9B-4E22-B544-79A90AB3DDC1}" type="datetime1">
               <a:rPr lang="de-DE" smtClean="0"/>
-              <a:t>25.11.2022</a:t>
+              <a:t>27.11.2022</a:t>
             </a:fld>
             <a:endParaRPr lang="de-DE"/>
           </a:p>

</xml_diff>

<commit_message>
adding server migration notes
</commit_message>
<xml_diff>
--- a/final/Discussion_paper.pptx
+++ b/final/Discussion_paper.pptx
@@ -289,7 +289,7 @@
           <a:p>
             <a:fld id="{BCDB334D-D17F-49C4-91DD-37BB7E818209}" type="datetimeFigureOut">
               <a:rPr lang="de-CH" smtClean="0"/>
-              <a:t>27.11.2022</a:t>
+              <a:t>29.11.2022</a:t>
             </a:fld>
             <a:endParaRPr lang="de-CH"/>
           </a:p>
@@ -714,7 +714,7 @@
           <a:p>
             <a:fld id="{3CF37669-2BCF-46DA-B042-E354827809F7}" type="datetime1">
               <a:rPr lang="de-DE" smtClean="0"/>
-              <a:t>27.11.2022</a:t>
+              <a:t>29.11.2022</a:t>
             </a:fld>
             <a:endParaRPr lang="de-DE"/>
           </a:p>
@@ -943,7 +943,7 @@
           <a:p>
             <a:fld id="{DD0AF57A-3629-4D20-9CDE-C9CA7A3667AA}" type="datetime1">
               <a:rPr lang="de-DE" smtClean="0"/>
-              <a:t>27.11.2022</a:t>
+              <a:t>29.11.2022</a:t>
             </a:fld>
             <a:endParaRPr lang="de-DE"/>
           </a:p>
@@ -1215,7 +1215,7 @@
           <a:p>
             <a:fld id="{A02690AB-37C5-464E-B999-AEA04CFF82B9}" type="datetime1">
               <a:rPr lang="de-DE" smtClean="0"/>
-              <a:t>27.11.2022</a:t>
+              <a:t>29.11.2022</a:t>
             </a:fld>
             <a:endParaRPr lang="de-DE" dirty="0"/>
           </a:p>
@@ -1524,7 +1524,7 @@
           <a:p>
             <a:fld id="{D6387CFC-9D6A-4A2B-A4A9-D1A02656E42F}" type="datetime1">
               <a:rPr lang="de-DE" smtClean="0"/>
-              <a:t>27.11.2022</a:t>
+              <a:t>29.11.2022</a:t>
             </a:fld>
             <a:endParaRPr lang="de-DE"/>
           </a:p>
@@ -2128,7 +2128,7 @@
           <a:p>
             <a:fld id="{FF15E650-2C9B-4E22-B544-79A90AB3DDC1}" type="datetime1">
               <a:rPr lang="de-DE" smtClean="0"/>
-              <a:t>27.11.2022</a:t>
+              <a:t>29.11.2022</a:t>
             </a:fld>
             <a:endParaRPr lang="de-DE"/>
           </a:p>
@@ -2461,7 +2461,7 @@
           <a:p>
             <a:fld id="{61621C89-5216-48C0-BC08-43A5D37DC60A}" type="datetime1">
               <a:rPr lang="de-DE" smtClean="0"/>
-              <a:t>27.11.2022</a:t>
+              <a:t>29.11.2022</a:t>
             </a:fld>
             <a:endParaRPr lang="de-DE"/>
           </a:p>
@@ -2585,7 +2585,7 @@
           <a:p>
             <a:fld id="{F1FF226D-F83D-4818-9860-D08642397BB7}" type="datetime1">
               <a:rPr lang="de-DE" smtClean="0"/>
-              <a:t>27.11.2022</a:t>
+              <a:t>29.11.2022</a:t>
             </a:fld>
             <a:endParaRPr lang="de-DE"/>
           </a:p>
@@ -2712,7 +2712,7 @@
           <a:p>
             <a:fld id="{A5F31C7A-EA54-4BF4-ACB0-2765243AF525}" type="datetime1">
               <a:rPr lang="de-DE" smtClean="0"/>
-              <a:t>27.11.2022</a:t>
+              <a:t>29.11.2022</a:t>
             </a:fld>
             <a:endParaRPr lang="de-DE"/>
           </a:p>
@@ -2855,7 +2855,7 @@
           <a:p>
             <a:fld id="{EFD419F0-1738-4192-8FF2-BE957FD32662}" type="datetime1">
               <a:rPr lang="de-DE" smtClean="0"/>
-              <a:t>27.11.2022</a:t>
+              <a:t>29.11.2022</a:t>
             </a:fld>
             <a:endParaRPr lang="de-DE"/>
           </a:p>
@@ -3253,7 +3253,7 @@
           <a:p>
             <a:fld id="{D78D58C2-FBCE-4B47-BBAC-2891E9120B14}" type="datetime1">
               <a:rPr lang="de-DE" smtClean="0"/>
-              <a:t>27.11.2022</a:t>
+              <a:t>29.11.2022</a:t>
             </a:fld>
             <a:endParaRPr lang="de-DE" dirty="0"/>
           </a:p>
@@ -3923,7 +3923,7 @@
           <a:p>
             <a:fld id="{3CF37669-2BCF-46DA-B042-E354827809F7}" type="datetime1">
               <a:rPr lang="de-DE" smtClean="0"/>
-              <a:t>27.11.2022</a:t>
+              <a:t>29.11.2022</a:t>
             </a:fld>
             <a:endParaRPr lang="de-DE"/>
           </a:p>
@@ -4084,7 +4084,7 @@
           <a:p>
             <a:fld id="{FF15E650-2C9B-4E22-B544-79A90AB3DDC1}" type="datetime1">
               <a:rPr lang="de-DE" smtClean="0"/>
-              <a:t>27.11.2022</a:t>
+              <a:t>29.11.2022</a:t>
             </a:fld>
             <a:endParaRPr lang="de-DE"/>
           </a:p>
@@ -4214,7 +4214,7 @@
           <a:p>
             <a:fld id="{FF15E650-2C9B-4E22-B544-79A90AB3DDC1}" type="datetime1">
               <a:rPr lang="de-DE" smtClean="0"/>
-              <a:t>27.11.2022</a:t>
+              <a:t>29.11.2022</a:t>
             </a:fld>
             <a:endParaRPr lang="de-DE"/>
           </a:p>
@@ -4316,7 +4316,7 @@
           <a:p>
             <a:fld id="{FF15E650-2C9B-4E22-B544-79A90AB3DDC1}" type="datetime1">
               <a:rPr lang="de-DE" smtClean="0"/>
-              <a:t>27.11.2022</a:t>
+              <a:t>29.11.2022</a:t>
             </a:fld>
             <a:endParaRPr lang="de-DE"/>
           </a:p>
@@ -4515,7 +4515,7 @@
           <a:p>
             <a:fld id="{FF15E650-2C9B-4E22-B544-79A90AB3DDC1}" type="datetime1">
               <a:rPr lang="de-DE" smtClean="0"/>
-              <a:t>27.11.2022</a:t>
+              <a:t>29.11.2022</a:t>
             </a:fld>
             <a:endParaRPr lang="de-DE"/>
           </a:p>
@@ -4633,14 +4633,14 @@
             <p:ph idx="1"/>
             <p:extLst>
               <p:ext uri="{D42A27DB-BD31-4B8C-83A1-F6EECF244321}">
-                <p14:modId xmlns:p14="http://schemas.microsoft.com/office/powerpoint/2010/main" val="420972061"/>
+                <p14:modId xmlns:p14="http://schemas.microsoft.com/office/powerpoint/2010/main" val="1070277297"/>
               </p:ext>
             </p:extLst>
           </p:nvPr>
         </p:nvGraphicFramePr>
         <p:xfrm>
           <a:off x="396751" y="1290446"/>
-          <a:ext cx="8496300" cy="5308600"/>
+          <a:ext cx="8496300" cy="4861701"/>
         </p:xfrm>
         <a:graphic>
           <a:graphicData uri="http://schemas.openxmlformats.org/drawingml/2006/table">
@@ -4678,10 +4678,10 @@
                     <a:lstStyle/>
                     <a:p>
                       <a:r>
-                        <a:rPr lang="en-US" sz="1400" dirty="0" smtClean="0"/>
+                        <a:rPr lang="en-US" sz="1200" dirty="0" smtClean="0"/>
                         <a:t>Dates</a:t>
                       </a:r>
-                      <a:endParaRPr lang="en-US" sz="1400" dirty="0"/>
+                      <a:endParaRPr lang="en-US" sz="1200" dirty="0"/>
                     </a:p>
                   </a:txBody>
                   <a:tcPr/>
@@ -4709,7 +4709,7 @@
                         <a:defRPr/>
                       </a:pPr>
                       <a:r>
-                        <a:rPr lang="en-US" sz="1400" dirty="0" smtClean="0"/>
+                        <a:rPr lang="en-US" sz="1200" dirty="0" smtClean="0"/>
                         <a:t>Work task</a:t>
                       </a:r>
                     </a:p>
@@ -4722,10 +4722,10 @@
                     <a:lstStyle/>
                     <a:p>
                       <a:r>
-                        <a:rPr lang="en-US" sz="1400" dirty="0" smtClean="0"/>
+                        <a:rPr lang="en-US" sz="1200" dirty="0" smtClean="0"/>
                         <a:t>Overall Deadlines/ Review</a:t>
                       </a:r>
-                      <a:endParaRPr lang="en-US" sz="1400" dirty="0"/>
+                      <a:endParaRPr lang="en-US" sz="1200" dirty="0"/>
                     </a:p>
                   </a:txBody>
                   <a:tcPr/>
@@ -4743,10 +4743,10 @@
                     <a:lstStyle/>
                     <a:p>
                       <a:r>
-                        <a:rPr lang="en-US" sz="1400" dirty="0" smtClean="0"/>
+                        <a:rPr lang="en-US" sz="1200" dirty="0" smtClean="0"/>
                         <a:t>25 Nov </a:t>
                       </a:r>
-                      <a:endParaRPr lang="en-US" sz="1400" dirty="0"/>
+                      <a:endParaRPr lang="en-US" sz="1200" dirty="0"/>
                     </a:p>
                   </a:txBody>
                   <a:tcPr/>
@@ -4761,11 +4761,11 @@
                         <a:buChar char="-"/>
                       </a:pPr>
                       <a:r>
-                        <a:rPr lang="en-US" sz="1400" dirty="0" smtClean="0"/>
+                        <a:rPr lang="en-US" sz="1200" dirty="0" smtClean="0"/>
                         <a:t>Model</a:t>
                       </a:r>
                       <a:r>
-                        <a:rPr lang="en-US" sz="1400" baseline="0" dirty="0" smtClean="0"/>
+                        <a:rPr lang="en-US" sz="1200" baseline="0" dirty="0" smtClean="0"/>
                         <a:t>: all views have all parameters allocated</a:t>
                       </a:r>
                     </a:p>
@@ -4775,7 +4775,7 @@
                         <a:buChar char="-"/>
                       </a:pPr>
                       <a:r>
-                        <a:rPr lang="en-US" sz="1400" baseline="0" dirty="0" smtClean="0"/>
+                        <a:rPr lang="en-US" sz="1200" baseline="0" dirty="0" smtClean="0"/>
                         <a:t>Model: environments reactivated</a:t>
                       </a:r>
                     </a:p>
@@ -4792,22 +4792,22 @@
                     <a:lstStyle/>
                     <a:p>
                       <a:r>
-                        <a:rPr lang="en-US" sz="1400" dirty="0" smtClean="0"/>
+                        <a:rPr lang="en-US" sz="1200" dirty="0" smtClean="0"/>
                         <a:t>Discussion (SSR):</a:t>
                       </a:r>
                       <a:r>
-                        <a:rPr lang="en-US" sz="1400" baseline="0" dirty="0" smtClean="0"/>
+                        <a:rPr lang="en-US" sz="1200" baseline="0" dirty="0" smtClean="0"/>
                         <a:t> </a:t>
                       </a:r>
                       <a:r>
-                        <a:rPr lang="en-US" sz="1400" dirty="0" smtClean="0"/>
+                        <a:rPr lang="en-US" sz="1200" dirty="0" smtClean="0"/>
                         <a:t>Section 2.1</a:t>
                       </a:r>
                       <a:r>
-                        <a:rPr lang="en-US" sz="1400" baseline="0" dirty="0" smtClean="0"/>
+                        <a:rPr lang="en-US" sz="1200" baseline="0" dirty="0" smtClean="0"/>
                         <a:t> + Figure 1 + Table 1 </a:t>
                       </a:r>
-                      <a:endParaRPr lang="en-US" sz="1400" dirty="0"/>
+                      <a:endParaRPr lang="en-US" sz="1200" dirty="0"/>
                     </a:p>
                   </a:txBody>
                   <a:tcPr>
@@ -4822,21 +4822,21 @@
                   </a:ext>
                 </a:extLst>
               </a:tr>
-              <a:tr h="370840">
+              <a:tr h="1381901">
                 <a:tc>
                   <a:txBody>
                     <a:bodyPr/>
                     <a:lstStyle/>
                     <a:p>
                       <a:r>
-                        <a:rPr lang="en-US" sz="1400" dirty="0" smtClean="0"/>
+                        <a:rPr lang="en-US" sz="1200" dirty="0" smtClean="0"/>
                         <a:t>2</a:t>
                       </a:r>
                       <a:r>
-                        <a:rPr lang="en-US" sz="1400" baseline="0" dirty="0" smtClean="0"/>
+                        <a:rPr lang="en-US" sz="1200" baseline="0" dirty="0" smtClean="0"/>
                         <a:t>7 Nov</a:t>
                       </a:r>
-                      <a:endParaRPr lang="en-US" sz="1400" dirty="0"/>
+                      <a:endParaRPr lang="en-US" sz="1200" dirty="0"/>
                     </a:p>
                   </a:txBody>
                   <a:tcPr>
@@ -4874,12 +4874,31 @@
                         <a:defRPr/>
                       </a:pPr>
                       <a:r>
-                        <a:rPr lang="en-US" sz="1400" dirty="0" smtClean="0"/>
-                        <a:t>Write Section</a:t>
-                      </a:r>
-                      <a:r>
-                        <a:rPr lang="en-US" sz="1400" baseline="0" dirty="0" smtClean="0"/>
-                        <a:t> 2.2. Model (Explain Figure 1)</a:t>
+                        <a:rPr lang="en-US" sz="1200" strike="sngStrike" baseline="0" dirty="0" smtClean="0"/>
+                        <a:t>Work on the model: string to integer table fix columns</a:t>
+                      </a:r>
+                    </a:p>
+                    <a:p>
+                      <a:pPr marL="0" marR="0" lvl="0" indent="0" algn="l" defTabSz="914400" rtl="0" eaLnBrk="1" fontAlgn="auto" latinLnBrk="0" hangingPunct="1">
+                        <a:lnSpc>
+                          <a:spcPct val="100000"/>
+                        </a:lnSpc>
+                        <a:spcBef>
+                          <a:spcPts val="0"/>
+                        </a:spcBef>
+                        <a:spcAft>
+                          <a:spcPts val="0"/>
+                        </a:spcAft>
+                        <a:buClrTx/>
+                        <a:buSzTx/>
+                        <a:buFontTx/>
+                        <a:buNone/>
+                        <a:tabLst/>
+                        <a:defRPr/>
+                      </a:pPr>
+                      <a:r>
+                        <a:rPr lang="en-US" sz="1200" dirty="0" smtClean="0"/>
+                        <a:t>Writing: </a:t>
                       </a:r>
                     </a:p>
                     <a:p>
@@ -4901,20 +4920,16 @@
                         <a:defRPr/>
                       </a:pPr>
                       <a:r>
-                        <a:rPr lang="en-US" sz="1400" dirty="0" smtClean="0"/>
-                        <a:t>(re)</a:t>
-                      </a:r>
-                      <a:r>
-                        <a:rPr lang="en-US" sz="1400" baseline="0" dirty="0" smtClean="0"/>
-                        <a:t> </a:t>
-                      </a:r>
-                      <a:r>
-                        <a:rPr lang="en-US" sz="1400" dirty="0" smtClean="0"/>
-                        <a:t>Write Section</a:t>
-                      </a:r>
-                      <a:r>
-                        <a:rPr lang="en-US" sz="1400" baseline="0" dirty="0" smtClean="0"/>
-                        <a:t> 2.2.1 Process User Inputs</a:t>
+                        <a:rPr lang="en-US" sz="1200" dirty="0" smtClean="0"/>
+                        <a:t>Write </a:t>
+                      </a:r>
+                      <a:r>
+                        <a:rPr lang="en-US" sz="1200" dirty="0" smtClean="0"/>
+                        <a:t>Section</a:t>
+                      </a:r>
+                      <a:r>
+                        <a:rPr lang="en-US" sz="1200" baseline="0" dirty="0" smtClean="0"/>
+                        <a:t> 2.2. Model (Explain Figure 1)</a:t>
                       </a:r>
                     </a:p>
                     <a:p>
@@ -4936,8 +4951,20 @@
                         <a:defRPr/>
                       </a:pPr>
                       <a:r>
-                        <a:rPr lang="en-US" sz="1400" baseline="0" dirty="0" smtClean="0"/>
-                        <a:t>Fix Table 2</a:t>
+                        <a:rPr lang="en-US" sz="1200" dirty="0" smtClean="0"/>
+                        <a:t>(re)</a:t>
+                      </a:r>
+                      <a:r>
+                        <a:rPr lang="en-US" sz="1200" baseline="0" dirty="0" smtClean="0"/>
+                        <a:t> </a:t>
+                      </a:r>
+                      <a:r>
+                        <a:rPr lang="en-US" sz="1200" dirty="0" smtClean="0"/>
+                        <a:t>Write Section</a:t>
+                      </a:r>
+                      <a:r>
+                        <a:rPr lang="en-US" sz="1200" baseline="0" dirty="0" smtClean="0"/>
+                        <a:t> 2.2.1 Process User Inputs</a:t>
                       </a:r>
                     </a:p>
                     <a:p>
@@ -4959,8 +4986,8 @@
                         <a:defRPr/>
                       </a:pPr>
                       <a:r>
-                        <a:rPr lang="en-US" sz="1400" baseline="0" dirty="0" smtClean="0"/>
-                        <a:t>Check figure 2 and improve with all buildings</a:t>
+                        <a:rPr lang="en-US" sz="1200" baseline="0" dirty="0" smtClean="0"/>
+                        <a:t>Fix Table 2</a:t>
                       </a:r>
                     </a:p>
                     <a:p>
@@ -4982,10 +5009,22 @@
                         <a:defRPr/>
                       </a:pPr>
                       <a:r>
-                        <a:rPr lang="en-US" sz="1400" baseline="0" dirty="0" smtClean="0"/>
-                        <a:t>Work on the model: string to integer table fix columns</a:t>
-                      </a:r>
-                      <a:endParaRPr lang="en-US" sz="1400" baseline="0" dirty="0" smtClean="0"/>
+                        <a:rPr lang="en-US" sz="1200" strike="sngStrike" baseline="0" dirty="0" smtClean="0"/>
+                        <a:t>Check figure 2 and </a:t>
+                      </a:r>
+                      <a:r>
+                        <a:rPr lang="en-US" sz="1200" strike="sngStrike" baseline="0" dirty="0" smtClean="0"/>
+                        <a:t>add </a:t>
+                      </a:r>
+                      <a:r>
+                        <a:rPr lang="en-US" sz="1200" strike="sngStrike" baseline="0" dirty="0" smtClean="0"/>
+                        <a:t>all </a:t>
+                      </a:r>
+                      <a:r>
+                        <a:rPr lang="en-US" sz="1200" strike="sngStrike" baseline="0" dirty="0" smtClean="0"/>
+                        <a:t>available buildings</a:t>
+                      </a:r>
+                      <a:endParaRPr lang="en-US" sz="1200" strike="sngStrike" baseline="0" dirty="0" smtClean="0"/>
                     </a:p>
                     <a:p>
                       <a:pPr marL="285750" marR="0" lvl="0" indent="-285750" algn="l" defTabSz="914400" rtl="0" eaLnBrk="1" fontAlgn="auto" latinLnBrk="0" hangingPunct="1">
@@ -5006,31 +5045,12 @@
                         <a:defRPr/>
                       </a:pPr>
                       <a:r>
-                        <a:rPr lang="en-US" sz="1400" strike="sngStrike" baseline="0" dirty="0" smtClean="0"/>
-                        <a:t>Check, maybe remove Table 3 </a:t>
-                      </a:r>
-                    </a:p>
-                    <a:p>
-                      <a:pPr marL="285750" marR="0" lvl="0" indent="-285750" algn="l" defTabSz="914400" rtl="0" eaLnBrk="1" fontAlgn="auto" latinLnBrk="0" hangingPunct="1">
-                        <a:lnSpc>
-                          <a:spcPct val="100000"/>
-                        </a:lnSpc>
-                        <a:spcBef>
-                          <a:spcPts val="0"/>
-                        </a:spcBef>
-                        <a:spcAft>
-                          <a:spcPts val="0"/>
-                        </a:spcAft>
-                        <a:buClrTx/>
-                        <a:buSzTx/>
-                        <a:buFontTx/>
-                        <a:buChar char="-"/>
-                        <a:tabLst/>
-                        <a:defRPr/>
-                      </a:pPr>
-                      <a:r>
-                        <a:rPr lang="en-US" sz="1400" baseline="0" dirty="0" smtClean="0"/>
-                        <a:t>Move SI to excel </a:t>
+                        <a:rPr lang="en-US" sz="1200" strike="sngStrike" baseline="0" dirty="0" smtClean="0"/>
+                        <a:t>Check</a:t>
+                      </a:r>
+                      <a:r>
+                        <a:rPr lang="en-US" sz="1200" strike="sngStrike" baseline="0" dirty="0" smtClean="0"/>
+                        <a:t>, maybe remove Table 3 </a:t>
                       </a:r>
                     </a:p>
                   </a:txBody>
@@ -5044,6 +5064,9 @@
                       <a:headEnd type="none" w="med" len="med"/>
                       <a:tailEnd type="none" w="med" len="med"/>
                     </a:lnB>
+                    <a:solidFill>
+                      <a:srgbClr val="FFFF00"/>
+                    </a:solidFill>
                   </a:tcPr>
                 </a:tc>
                 <a:tc>
@@ -5051,7 +5074,7 @@
                     <a:bodyPr/>
                     <a:lstStyle/>
                     <a:p>
-                      <a:endParaRPr lang="en-US" sz="1400" dirty="0"/>
+                      <a:endParaRPr lang="en-US" sz="1200" dirty="0"/>
                     </a:p>
                   </a:txBody>
                   <a:tcPr>
@@ -5079,10 +5102,14 @@
                     <a:lstStyle/>
                     <a:p>
                       <a:r>
-                        <a:rPr lang="en-US" sz="1400" dirty="0" smtClean="0"/>
-                        <a:t>28 Nov</a:t>
-                      </a:r>
-                      <a:endParaRPr lang="en-US" sz="1400" dirty="0"/>
+                        <a:rPr lang="en-US" sz="1200" dirty="0" smtClean="0"/>
+                        <a:t>28 </a:t>
+                      </a:r>
+                      <a:r>
+                        <a:rPr lang="en-US" sz="1200" smtClean="0"/>
+                        <a:t>Nov (+backlog 27)</a:t>
+                      </a:r>
+                      <a:endParaRPr lang="en-US" sz="1200" dirty="0"/>
                     </a:p>
                   </a:txBody>
                   <a:tcPr>
@@ -5120,12 +5147,43 @@
                         <a:defRPr/>
                       </a:pPr>
                       <a:r>
-                        <a:rPr lang="en-US" sz="1400" dirty="0" smtClean="0"/>
-                        <a:t>Write</a:t>
-                      </a:r>
-                      <a:r>
-                        <a:rPr lang="en-US" sz="1400" baseline="0" dirty="0" smtClean="0"/>
-                        <a:t> Section 2.2.2. Calculate U Values </a:t>
+                        <a:rPr lang="en-US" sz="1200" strike="sngStrike" baseline="0" dirty="0" smtClean="0"/>
+                        <a:t>Meeting </a:t>
+                      </a:r>
+                      <a:r>
+                        <a:rPr lang="en-US" sz="1200" strike="sngStrike" baseline="0" dirty="0" smtClean="0"/>
+                        <a:t>Rene (discuss final results</a:t>
+                      </a:r>
+                      <a:r>
+                        <a:rPr lang="en-US" sz="1200" strike="sngStrike" baseline="0" dirty="0" smtClean="0"/>
+                        <a:t>)</a:t>
+                      </a:r>
+                    </a:p>
+                    <a:p>
+                      <a:pPr marL="0" marR="0" lvl="0" indent="0" algn="l" defTabSz="914400" rtl="0" eaLnBrk="1" fontAlgn="auto" latinLnBrk="0" hangingPunct="1">
+                        <a:lnSpc>
+                          <a:spcPct val="100000"/>
+                        </a:lnSpc>
+                        <a:spcBef>
+                          <a:spcPts val="0"/>
+                        </a:spcBef>
+                        <a:spcAft>
+                          <a:spcPts val="0"/>
+                        </a:spcAft>
+                        <a:buClrTx/>
+                        <a:buSzTx/>
+                        <a:buFontTx/>
+                        <a:buNone/>
+                        <a:tabLst/>
+                        <a:defRPr/>
+                      </a:pPr>
+                      <a:r>
+                        <a:rPr lang="en-US" sz="1200" strike="noStrike" baseline="0" dirty="0" smtClean="0"/>
+                        <a:t>Writing</a:t>
+                      </a:r>
+                      <a:r>
+                        <a:rPr lang="en-US" sz="1200" strike="sngStrike" baseline="0" dirty="0" smtClean="0"/>
+                        <a:t>: </a:t>
                       </a:r>
                     </a:p>
                     <a:p>
@@ -5147,12 +5205,12 @@
                         <a:defRPr/>
                       </a:pPr>
                       <a:r>
-                        <a:rPr lang="en-US" sz="1400" dirty="0" smtClean="0"/>
-                        <a:t>Write</a:t>
-                      </a:r>
-                      <a:r>
-                        <a:rPr lang="en-US" sz="1400" baseline="0" dirty="0" smtClean="0"/>
-                        <a:t> Section 2.2.3. Calculate Space heating </a:t>
+                        <a:rPr lang="en-US" sz="1200" dirty="0" smtClean="0"/>
+                        <a:t>Write Section</a:t>
+                      </a:r>
+                      <a:r>
+                        <a:rPr lang="en-US" sz="1200" baseline="0" dirty="0" smtClean="0"/>
+                        <a:t> 2.2. Model (Explain Figure 1)</a:t>
                       </a:r>
                     </a:p>
                     <a:p>
@@ -5174,8 +5232,20 @@
                         <a:defRPr/>
                       </a:pPr>
                       <a:r>
-                        <a:rPr lang="en-US" sz="1400" dirty="0" smtClean="0"/>
-                        <a:t>Model: Ventilation parameters fix </a:t>
+                        <a:rPr lang="en-US" sz="1200" dirty="0" smtClean="0"/>
+                        <a:t>(re)</a:t>
+                      </a:r>
+                      <a:r>
+                        <a:rPr lang="en-US" sz="1200" baseline="0" dirty="0" smtClean="0"/>
+                        <a:t> </a:t>
+                      </a:r>
+                      <a:r>
+                        <a:rPr lang="en-US" sz="1200" dirty="0" smtClean="0"/>
+                        <a:t>Write Section</a:t>
+                      </a:r>
+                      <a:r>
+                        <a:rPr lang="en-US" sz="1200" baseline="0" dirty="0" smtClean="0"/>
+                        <a:t> 2.2.1 Process User Inputs</a:t>
                       </a:r>
                     </a:p>
                     <a:p>
@@ -5197,43 +5267,8 @@
                         <a:defRPr/>
                       </a:pPr>
                       <a:r>
-                        <a:rPr lang="en-US" sz="1400" dirty="0" smtClean="0"/>
-                        <a:t>Figure</a:t>
-                      </a:r>
-                      <a:r>
-                        <a:rPr lang="en-US" sz="1400" baseline="0" dirty="0" smtClean="0"/>
-                        <a:t> 1 + new: </a:t>
-                      </a:r>
-                      <a:r>
-                        <a:rPr lang="en-US" sz="1400" dirty="0" smtClean="0"/>
-                        <a:t>Ventilation</a:t>
-                      </a:r>
-                      <a:r>
-                        <a:rPr lang="en-US" sz="1400" baseline="0" dirty="0" smtClean="0"/>
-                        <a:t> flow chart concept </a:t>
-                      </a:r>
-                    </a:p>
-                    <a:p>
-                      <a:pPr marL="285750" marR="0" lvl="0" indent="-285750" algn="l" defTabSz="914400" rtl="0" eaLnBrk="1" fontAlgn="auto" latinLnBrk="0" hangingPunct="1">
-                        <a:lnSpc>
-                          <a:spcPct val="100000"/>
-                        </a:lnSpc>
-                        <a:spcBef>
-                          <a:spcPts val="0"/>
-                        </a:spcBef>
-                        <a:spcAft>
-                          <a:spcPts val="0"/>
-                        </a:spcAft>
-                        <a:buClrTx/>
-                        <a:buSzTx/>
-                        <a:buFontTx/>
-                        <a:buChar char="-"/>
-                        <a:tabLst/>
-                        <a:defRPr/>
-                      </a:pPr>
-                      <a:r>
-                        <a:rPr lang="en-US" sz="1400" baseline="0" dirty="0" smtClean="0"/>
-                        <a:t>Meeting Rene (discuss final results)</a:t>
+                        <a:rPr lang="en-US" sz="1200" baseline="0" dirty="0" smtClean="0"/>
+                        <a:t>Fix Table 2</a:t>
                       </a:r>
                     </a:p>
                   </a:txBody>
@@ -5247,6 +5282,9 @@
                       <a:headEnd type="none" w="med" len="med"/>
                       <a:tailEnd type="none" w="med" len="med"/>
                     </a:lnT>
+                    <a:solidFill>
+                      <a:srgbClr val="FFFF00"/>
+                    </a:solidFill>
                   </a:tcPr>
                 </a:tc>
                 <a:tc>
@@ -5255,20 +5293,24 @@
                     <a:lstStyle/>
                     <a:p>
                       <a:r>
-                        <a:rPr lang="en-US" sz="1400" dirty="0" smtClean="0"/>
+                        <a:rPr lang="en-US" sz="1200" dirty="0" smtClean="0"/>
                         <a:t>Sasha checks </a:t>
                       </a:r>
                     </a:p>
                     <a:p>
                       <a:r>
-                        <a:rPr lang="en-US" sz="1400" dirty="0" smtClean="0"/>
+                        <a:rPr lang="en-US" sz="1200" dirty="0" smtClean="0"/>
                         <a:t>Writings</a:t>
                       </a:r>
                       <a:r>
-                        <a:rPr lang="en-US" sz="1400" baseline="0" dirty="0" smtClean="0"/>
-                        <a:t> on Section 2.2, Section 2.2.1 , 2.2.2</a:t>
-                      </a:r>
-                      <a:endParaRPr lang="en-US" sz="1400" dirty="0"/>
+                        <a:rPr lang="en-US" sz="1200" baseline="0" dirty="0" smtClean="0"/>
+                        <a:t> on Section 2.2, Section </a:t>
+                      </a:r>
+                      <a:r>
+                        <a:rPr lang="en-US" sz="1200" baseline="0" dirty="0" smtClean="0"/>
+                        <a:t>2.2.1</a:t>
+                      </a:r>
+                      <a:endParaRPr lang="en-US" sz="1200" dirty="0"/>
                     </a:p>
                   </a:txBody>
                   <a:tcPr>
@@ -5296,10 +5338,14 @@
                     <a:lstStyle/>
                     <a:p>
                       <a:r>
-                        <a:rPr lang="en-US" sz="1400" dirty="0" smtClean="0"/>
-                        <a:t>29 Nov</a:t>
-                      </a:r>
-                      <a:endParaRPr lang="en-US" sz="1400" dirty="0"/>
+                        <a:rPr lang="en-US" sz="1200" dirty="0" smtClean="0"/>
+                        <a:t>29 </a:t>
+                      </a:r>
+                      <a:r>
+                        <a:rPr lang="en-US" sz="1200" dirty="0" smtClean="0"/>
+                        <a:t>Nov (+ backlog 28)</a:t>
+                      </a:r>
+                      <a:endParaRPr lang="en-US" sz="1200" dirty="0"/>
                     </a:p>
                   </a:txBody>
                   <a:tcPr/>
@@ -5327,8 +5373,12 @@
                         <a:defRPr/>
                       </a:pPr>
                       <a:r>
-                        <a:rPr lang="en-US" sz="1400" baseline="0" dirty="0" smtClean="0"/>
-                        <a:t>Model: Check new results </a:t>
+                        <a:rPr lang="en-US" sz="1200" dirty="0" smtClean="0"/>
+                        <a:t>Write</a:t>
+                      </a:r>
+                      <a:r>
+                        <a:rPr lang="en-US" sz="1200" baseline="0" dirty="0" smtClean="0"/>
+                        <a:t> Section 2.2.2. Calculate U Values </a:t>
                       </a:r>
                     </a:p>
                     <a:p>
@@ -5350,10 +5400,13 @@
                         <a:defRPr/>
                       </a:pPr>
                       <a:r>
-                        <a:rPr lang="en-US" sz="1400" baseline="0" dirty="0" smtClean="0"/>
-                        <a:t>Finish Section 2.2.3 Space heating demand </a:t>
-                      </a:r>
-                      <a:endParaRPr lang="en-US" sz="1400" dirty="0" smtClean="0"/>
+                        <a:rPr lang="en-US" sz="1200" dirty="0" smtClean="0"/>
+                        <a:t>Write</a:t>
+                      </a:r>
+                      <a:r>
+                        <a:rPr lang="en-US" sz="1200" baseline="0" dirty="0" smtClean="0"/>
+                        <a:t> Section 2.2.3. Calculate Space heating </a:t>
+                      </a:r>
                     </a:p>
                     <a:p>
                       <a:pPr marL="285750" marR="0" lvl="0" indent="-285750" algn="l" defTabSz="914400" rtl="0" eaLnBrk="1" fontAlgn="auto" latinLnBrk="0" hangingPunct="1">
@@ -5374,8 +5427,8 @@
                         <a:defRPr/>
                       </a:pPr>
                       <a:r>
-                        <a:rPr lang="en-US" sz="1400" baseline="0" dirty="0" smtClean="0"/>
-                        <a:t>check figure 3, table 6</a:t>
+                        <a:rPr lang="en-US" sz="1200" baseline="0" dirty="0" smtClean="0"/>
+                        <a:t>Move SI to excel </a:t>
                       </a:r>
                     </a:p>
                   </a:txBody>
@@ -5386,15 +5439,43 @@
                     <a:bodyPr/>
                     <a:lstStyle/>
                     <a:p>
-                      <a:r>
-                        <a:rPr lang="en-US" sz="1400" dirty="0" smtClean="0"/>
-                        <a:t>Sasha checks 2.2.3</a:t>
-                      </a:r>
-                      <a:r>
-                        <a:rPr lang="en-US" sz="1400" baseline="0" dirty="0" smtClean="0"/>
-                        <a:t> and discuss model ( u value, heat demand) </a:t>
-                      </a:r>
-                      <a:endParaRPr lang="en-US" sz="1400" dirty="0"/>
+                      <a:pPr marL="0" marR="0" lvl="0" indent="0" algn="l" defTabSz="914400" rtl="0" eaLnBrk="1" fontAlgn="auto" latinLnBrk="0" hangingPunct="1">
+                        <a:lnSpc>
+                          <a:spcPct val="100000"/>
+                        </a:lnSpc>
+                        <a:spcBef>
+                          <a:spcPts val="0"/>
+                        </a:spcBef>
+                        <a:spcAft>
+                          <a:spcPts val="0"/>
+                        </a:spcAft>
+                        <a:buClrTx/>
+                        <a:buSzTx/>
+                        <a:buFontTx/>
+                        <a:buNone/>
+                        <a:tabLst/>
+                        <a:defRPr/>
+                      </a:pPr>
+                      <a:r>
+                        <a:rPr lang="en-US" sz="1200" dirty="0" smtClean="0"/>
+                        <a:t>Sasha </a:t>
+                      </a:r>
+                      <a:r>
+                        <a:rPr lang="en-US" sz="1200" dirty="0" smtClean="0"/>
+                        <a:t>checks</a:t>
+                      </a:r>
+                      <a:r>
+                        <a:rPr lang="en-US" sz="1200" baseline="0" dirty="0" smtClean="0"/>
+                        <a:t>, 2.2.2</a:t>
+                      </a:r>
+                      <a:endParaRPr lang="en-US" sz="1200" dirty="0" smtClean="0"/>
+                    </a:p>
+                    <a:p>
+                      <a:r>
+                        <a:rPr lang="en-US" sz="1200" dirty="0" smtClean="0"/>
+                        <a:t> 2.2.3</a:t>
+                      </a:r>
+                      <a:endParaRPr lang="en-US" sz="1200" dirty="0"/>
                     </a:p>
                   </a:txBody>
                   <a:tcPr/>
@@ -5412,10 +5493,10 @@
                     <a:lstStyle/>
                     <a:p>
                       <a:r>
-                        <a:rPr lang="en-US" sz="1400" dirty="0" smtClean="0"/>
+                        <a:rPr lang="en-US" sz="1200" dirty="0" smtClean="0"/>
                         <a:t>30 Nov</a:t>
                       </a:r>
-                      <a:endParaRPr lang="en-US" sz="1400" dirty="0"/>
+                      <a:endParaRPr lang="en-US" sz="1200" dirty="0"/>
                     </a:p>
                   </a:txBody>
                   <a:tcPr/>
@@ -5425,23 +5506,153 @@
                     <a:bodyPr/>
                     <a:lstStyle/>
                     <a:p>
-                      <a:pPr marL="285750" indent="-285750">
+                      <a:pPr marL="0" marR="0" lvl="0" indent="-285750" algn="l" defTabSz="914400" rtl="0" eaLnBrk="1" fontAlgn="auto" latinLnBrk="0" hangingPunct="1">
+                        <a:lnSpc>
+                          <a:spcPct val="100000"/>
+                        </a:lnSpc>
+                        <a:spcBef>
+                          <a:spcPts val="0"/>
+                        </a:spcBef>
+                        <a:spcAft>
+                          <a:spcPts val="0"/>
+                        </a:spcAft>
+                        <a:buClrTx/>
+                        <a:buSzTx/>
                         <a:buFontTx/>
                         <a:buChar char="-"/>
+                        <a:tabLst/>
+                        <a:defRPr/>
                       </a:pPr>
                       <a:r>
-                        <a:rPr lang="en-US" sz="1400" baseline="0" dirty="0" smtClean="0"/>
-                        <a:t>Check LCA calculations (KBOB sources) and adapt section 2.2.4 writing (if needed)</a:t>
+                        <a:rPr lang="en-US" sz="1200" kern="1200" dirty="0" smtClean="0">
+                          <a:solidFill>
+                            <a:schemeClr val="dk1"/>
+                          </a:solidFill>
+                          <a:latin typeface="+mn-lt"/>
+                          <a:ea typeface="+mn-ea"/>
+                          <a:cs typeface="+mn-cs"/>
+                        </a:rPr>
+                        <a:t>Model: Ventilation parameters fix </a:t>
                       </a:r>
                     </a:p>
                     <a:p>
-                      <a:pPr marL="285750" indent="-285750">
+                      <a:pPr marL="0" marR="0" lvl="0" indent="-285750" algn="l" defTabSz="914400" rtl="0" eaLnBrk="1" fontAlgn="auto" latinLnBrk="0" hangingPunct="1">
+                        <a:lnSpc>
+                          <a:spcPct val="100000"/>
+                        </a:lnSpc>
+                        <a:spcBef>
+                          <a:spcPts val="0"/>
+                        </a:spcBef>
+                        <a:spcAft>
+                          <a:spcPts val="0"/>
+                        </a:spcAft>
+                        <a:buClrTx/>
+                        <a:buSzTx/>
                         <a:buFontTx/>
                         <a:buChar char="-"/>
+                        <a:tabLst/>
+                        <a:defRPr/>
                       </a:pPr>
                       <a:r>
-                        <a:rPr lang="en-US" sz="1400" baseline="0" dirty="0" smtClean="0"/>
-                        <a:t>Check Figure 4 and add operational and embodied emissions</a:t>
+                        <a:rPr lang="en-US" sz="1200" kern="1200" dirty="0" smtClean="0">
+                          <a:solidFill>
+                            <a:schemeClr val="dk1"/>
+                          </a:solidFill>
+                          <a:latin typeface="+mn-lt"/>
+                          <a:ea typeface="+mn-ea"/>
+                          <a:cs typeface="+mn-cs"/>
+                        </a:rPr>
+                        <a:t>Figure 1 + new: Ventilation flow chart concept </a:t>
+                      </a:r>
+                    </a:p>
+                    <a:p>
+                      <a:pPr marL="0" marR="0" lvl="0" indent="-285750" algn="l" defTabSz="914400" rtl="0" eaLnBrk="1" fontAlgn="auto" latinLnBrk="0" hangingPunct="1">
+                        <a:lnSpc>
+                          <a:spcPct val="100000"/>
+                        </a:lnSpc>
+                        <a:spcBef>
+                          <a:spcPts val="0"/>
+                        </a:spcBef>
+                        <a:spcAft>
+                          <a:spcPts val="0"/>
+                        </a:spcAft>
+                        <a:buClrTx/>
+                        <a:buSzTx/>
+                        <a:buFontTx/>
+                        <a:buChar char="-"/>
+                        <a:tabLst/>
+                        <a:defRPr/>
+                      </a:pPr>
+                      <a:r>
+                        <a:rPr lang="en-US" sz="1200" kern="1200" dirty="0" smtClean="0">
+                          <a:solidFill>
+                            <a:schemeClr val="dk1"/>
+                          </a:solidFill>
+                          <a:latin typeface="+mn-lt"/>
+                          <a:ea typeface="+mn-ea"/>
+                          <a:cs typeface="+mn-cs"/>
+                        </a:rPr>
+                        <a:t>Model: Check new results </a:t>
+                      </a:r>
+                    </a:p>
+                    <a:p>
+                      <a:pPr marL="0" marR="0" lvl="0" indent="-285750" algn="l" defTabSz="914400" rtl="0" eaLnBrk="1" fontAlgn="auto" latinLnBrk="0" hangingPunct="1">
+                        <a:lnSpc>
+                          <a:spcPct val="100000"/>
+                        </a:lnSpc>
+                        <a:spcBef>
+                          <a:spcPts val="0"/>
+                        </a:spcBef>
+                        <a:spcAft>
+                          <a:spcPts val="0"/>
+                        </a:spcAft>
+                        <a:buClrTx/>
+                        <a:buSzTx/>
+                        <a:buFontTx/>
+                        <a:buChar char="-"/>
+                        <a:tabLst/>
+                        <a:defRPr/>
+                      </a:pPr>
+                      <a:r>
+                        <a:rPr lang="en-US" sz="1200" kern="1200" dirty="0" smtClean="0">
+                          <a:solidFill>
+                            <a:schemeClr val="dk1"/>
+                          </a:solidFill>
+                          <a:latin typeface="+mn-lt"/>
+                          <a:ea typeface="+mn-ea"/>
+                          <a:cs typeface="+mn-cs"/>
+                        </a:rPr>
+                        <a:t>Finish Section 2.2.3 Space heating demand </a:t>
+                      </a:r>
+                    </a:p>
+                    <a:p>
+                      <a:pPr marL="0" marR="0" lvl="0" indent="-285750" algn="l" defTabSz="914400" rtl="0" eaLnBrk="1" fontAlgn="auto" latinLnBrk="0" hangingPunct="1">
+                        <a:lnSpc>
+                          <a:spcPct val="100000"/>
+                        </a:lnSpc>
+                        <a:spcBef>
+                          <a:spcPts val="0"/>
+                        </a:spcBef>
+                        <a:spcAft>
+                          <a:spcPts val="0"/>
+                        </a:spcAft>
+                        <a:buClrTx/>
+                        <a:buSzTx/>
+                        <a:buFontTx/>
+                        <a:buChar char="-"/>
+                        <a:tabLst/>
+                        <a:defRPr/>
+                      </a:pPr>
+                      <a:r>
+                        <a:rPr lang="en-US" sz="1200" kern="1200" dirty="0" smtClean="0">
+                          <a:solidFill>
+                            <a:schemeClr val="dk1"/>
+                          </a:solidFill>
+                          <a:latin typeface="+mn-lt"/>
+                          <a:ea typeface="+mn-ea"/>
+                          <a:cs typeface="+mn-cs"/>
+                        </a:rPr>
+                        <a:t>check figure 3, table 6</a:t>
                       </a:r>
                     </a:p>
                   </a:txBody>
@@ -5452,11 +5663,15 @@
                     <a:bodyPr/>
                     <a:lstStyle/>
                     <a:p>
-                      <a:r>
-                        <a:rPr lang="en-US" sz="1400" dirty="0" smtClean="0"/>
-                        <a:t>Sasha checks and discuss 2.2.4 (LCA)</a:t>
-                      </a:r>
-                      <a:endParaRPr lang="en-US" sz="1400" dirty="0"/>
+                      <a:pPr marL="0" algn="l" defTabSz="914400" rtl="0" eaLnBrk="1" latinLnBrk="0" hangingPunct="1"/>
+                      <a:endParaRPr lang="en-US" sz="1200" kern="1200" dirty="0">
+                        <a:solidFill>
+                          <a:schemeClr val="dk1"/>
+                        </a:solidFill>
+                        <a:latin typeface="+mn-lt"/>
+                        <a:ea typeface="+mn-ea"/>
+                        <a:cs typeface="+mn-cs"/>
+                      </a:endParaRPr>
                     </a:p>
                   </a:txBody>
                   <a:tcPr/>
@@ -5488,7 +5703,7 @@
           <a:p>
             <a:fld id="{A02690AB-37C5-464E-B999-AEA04CFF82B9}" type="datetime1">
               <a:rPr lang="de-DE" smtClean="0"/>
-              <a:t>27.11.2022</a:t>
+              <a:t>29.11.2022</a:t>
             </a:fld>
             <a:endParaRPr lang="de-DE" dirty="0"/>
           </a:p>
@@ -5618,7 +5833,7 @@
           <a:p>
             <a:fld id="{FF15E650-2C9B-4E22-B544-79A90AB3DDC1}" type="datetime1">
               <a:rPr lang="de-DE" smtClean="0"/>
-              <a:t>27.11.2022</a:t>
+              <a:t>29.11.2022</a:t>
             </a:fld>
             <a:endParaRPr lang="de-DE"/>
           </a:p>
@@ -5702,14 +5917,14 @@
             <p:ph idx="1"/>
             <p:extLst>
               <p:ext uri="{D42A27DB-BD31-4B8C-83A1-F6EECF244321}">
-                <p14:modId xmlns:p14="http://schemas.microsoft.com/office/powerpoint/2010/main" val="1227495081"/>
+                <p14:modId xmlns:p14="http://schemas.microsoft.com/office/powerpoint/2010/main" val="4220425281"/>
               </p:ext>
             </p:extLst>
           </p:nvPr>
         </p:nvGraphicFramePr>
         <p:xfrm>
           <a:off x="323850" y="1609746"/>
-          <a:ext cx="8496300" cy="4734560"/>
+          <a:ext cx="8496300" cy="5069840"/>
         </p:xfrm>
         <a:graphic>
           <a:graphicData uri="http://schemas.openxmlformats.org/drawingml/2006/table">
@@ -5747,10 +5962,10 @@
                     <a:lstStyle/>
                     <a:p>
                       <a:r>
-                        <a:rPr lang="en-US" sz="1400" dirty="0" smtClean="0"/>
+                        <a:rPr lang="en-US" sz="1200" dirty="0" smtClean="0"/>
                         <a:t>Dates</a:t>
                       </a:r>
-                      <a:endParaRPr lang="en-US" sz="1400" dirty="0"/>
+                      <a:endParaRPr lang="en-US" sz="1200" dirty="0"/>
                     </a:p>
                   </a:txBody>
                   <a:tcPr/>
@@ -5778,7 +5993,7 @@
                         <a:defRPr/>
                       </a:pPr>
                       <a:r>
-                        <a:rPr lang="en-US" sz="1400" dirty="0" smtClean="0"/>
+                        <a:rPr lang="en-US" sz="1200" dirty="0" smtClean="0"/>
                         <a:t>Work task</a:t>
                       </a:r>
                     </a:p>
@@ -5791,10 +6006,10 @@
                     <a:lstStyle/>
                     <a:p>
                       <a:r>
-                        <a:rPr lang="en-US" sz="1400" dirty="0" smtClean="0"/>
+                        <a:rPr lang="en-US" sz="1200" dirty="0" smtClean="0"/>
                         <a:t>Overall Deadlines</a:t>
                       </a:r>
-                      <a:endParaRPr lang="en-US" sz="1400" dirty="0"/>
+                      <a:endParaRPr lang="en-US" sz="1200" dirty="0"/>
                     </a:p>
                   </a:txBody>
                   <a:tcPr/>
@@ -5812,10 +6027,10 @@
                     <a:lstStyle/>
                     <a:p>
                       <a:r>
-                        <a:rPr lang="en-US" sz="1400" dirty="0" smtClean="0"/>
+                        <a:rPr lang="en-US" sz="1200" dirty="0" smtClean="0"/>
                         <a:t>1 Dec</a:t>
                       </a:r>
-                      <a:endParaRPr lang="en-US" sz="1400" dirty="0"/>
+                      <a:endParaRPr lang="en-US" sz="1200" dirty="0"/>
                     </a:p>
                   </a:txBody>
                   <a:tcPr/>
@@ -5830,8 +6045,8 @@
                         <a:buChar char="-"/>
                       </a:pPr>
                       <a:r>
-                        <a:rPr lang="en-US" sz="1400" baseline="0" dirty="0" smtClean="0"/>
-                        <a:t>Write Section 2.2.5. Scenario assessment </a:t>
+                        <a:rPr lang="en-US" sz="1200" baseline="0" dirty="0" smtClean="0"/>
+                        <a:t>Check LCA calculations (KBOB sources) and adapt section 2.2.4 writing (if needed)</a:t>
                       </a:r>
                     </a:p>
                     <a:p>
@@ -5840,28 +6055,8 @@
                         <a:buChar char="-"/>
                       </a:pPr>
                       <a:r>
-                        <a:rPr lang="en-US" sz="1400" baseline="0" dirty="0" smtClean="0"/>
-                        <a:t>Check Table 4</a:t>
-                      </a:r>
-                    </a:p>
-                    <a:p>
-                      <a:pPr marL="285750" indent="-285750">
-                        <a:buFontTx/>
-                        <a:buChar char="-"/>
-                      </a:pPr>
-                      <a:r>
-                        <a:rPr lang="en-US" sz="1400" baseline="0" dirty="0" smtClean="0"/>
-                        <a:t>Check Figure 5 </a:t>
-                      </a:r>
-                    </a:p>
-                    <a:p>
-                      <a:pPr marL="285750" indent="-285750">
-                        <a:buFontTx/>
-                        <a:buChar char="-"/>
-                      </a:pPr>
-                      <a:r>
-                        <a:rPr lang="en-US" sz="1400" baseline="0" dirty="0" smtClean="0"/>
-                        <a:t>Check model scenario setup</a:t>
+                        <a:rPr lang="en-US" sz="1200" baseline="0" dirty="0" smtClean="0"/>
+                        <a:t>Check Figure 4 and add operational and embodied emissions</a:t>
                       </a:r>
                     </a:p>
                   </a:txBody>
@@ -5872,11 +6067,37 @@
                     <a:bodyPr/>
                     <a:lstStyle/>
                     <a:p>
-                      <a:r>
-                        <a:rPr lang="en-US" sz="1400" dirty="0" smtClean="0"/>
-                        <a:t>Sasha checks 2.2.5</a:t>
-                      </a:r>
-                      <a:endParaRPr lang="en-US" sz="1400" dirty="0"/>
+                      <a:pPr marL="0" marR="0" lvl="0" indent="0" algn="l" defTabSz="914400" rtl="0" eaLnBrk="1" fontAlgn="auto" latinLnBrk="0" hangingPunct="1">
+                        <a:lnSpc>
+                          <a:spcPct val="100000"/>
+                        </a:lnSpc>
+                        <a:spcBef>
+                          <a:spcPts val="0"/>
+                        </a:spcBef>
+                        <a:spcAft>
+                          <a:spcPts val="0"/>
+                        </a:spcAft>
+                        <a:buClrTx/>
+                        <a:buSzTx/>
+                        <a:buFontTx/>
+                        <a:buNone/>
+                        <a:tabLst/>
+                        <a:defRPr/>
+                      </a:pPr>
+                      <a:r>
+                        <a:rPr lang="en-US" sz="1200" kern="1200" dirty="0" smtClean="0">
+                          <a:solidFill>
+                            <a:schemeClr val="dk1"/>
+                          </a:solidFill>
+                          <a:latin typeface="+mn-lt"/>
+                          <a:ea typeface="+mn-ea"/>
+                          <a:cs typeface="+mn-cs"/>
+                        </a:rPr>
+                        <a:t>Sasha discuss model ( u value, heat demand</a:t>
+                      </a:r>
+                    </a:p>
+                    <a:p>
+                      <a:endParaRPr lang="en-US" sz="1200" dirty="0"/>
                     </a:p>
                   </a:txBody>
                   <a:tcPr/>
@@ -5894,16 +6115,141 @@
                     <a:lstStyle/>
                     <a:p>
                       <a:r>
-                        <a:rPr lang="en-US" sz="1400" dirty="0" smtClean="0"/>
+                        <a:rPr lang="en-US" sz="1200" dirty="0" smtClean="0"/>
                         <a:t>2 Dec</a:t>
                       </a:r>
-                      <a:endParaRPr lang="en-US" sz="1400" dirty="0"/>
+                      <a:endParaRPr lang="en-US" sz="1200" dirty="0"/>
                     </a:p>
                   </a:txBody>
                   <a:tcPr>
                     <a:lnB w="12700" cmpd="sng">
                       <a:noFill/>
                     </a:lnB>
+                  </a:tcPr>
+                </a:tc>
+                <a:tc>
+                  <a:txBody>
+                    <a:bodyPr/>
+                    <a:lstStyle/>
+                    <a:p>
+                      <a:pPr marL="285750" indent="-285750">
+                        <a:buFontTx/>
+                        <a:buChar char="-"/>
+                      </a:pPr>
+                      <a:r>
+                        <a:rPr lang="en-US" sz="1200" baseline="0" dirty="0" smtClean="0"/>
+                        <a:t>Write Section 2.2.5. Scenario assessment </a:t>
+                      </a:r>
+                    </a:p>
+                    <a:p>
+                      <a:pPr marL="285750" indent="-285750">
+                        <a:buFontTx/>
+                        <a:buChar char="-"/>
+                      </a:pPr>
+                      <a:r>
+                        <a:rPr lang="en-US" sz="1200" baseline="0" dirty="0" smtClean="0"/>
+                        <a:t>Check Table 4</a:t>
+                      </a:r>
+                    </a:p>
+                    <a:p>
+                      <a:pPr marL="285750" indent="-285750">
+                        <a:buFontTx/>
+                        <a:buChar char="-"/>
+                      </a:pPr>
+                      <a:r>
+                        <a:rPr lang="en-US" sz="1200" baseline="0" dirty="0" smtClean="0"/>
+                        <a:t>Check Figure 5 </a:t>
+                      </a:r>
+                    </a:p>
+                    <a:p>
+                      <a:pPr marL="285750" indent="-285750">
+                        <a:buFontTx/>
+                        <a:buChar char="-"/>
+                      </a:pPr>
+                      <a:r>
+                        <a:rPr lang="en-US" sz="1200" baseline="0" dirty="0" smtClean="0"/>
+                        <a:t>Check model scenario setup</a:t>
+                      </a:r>
+                    </a:p>
+                  </a:txBody>
+                  <a:tcPr>
+                    <a:lnB w="12700" cmpd="sng">
+                      <a:noFill/>
+                    </a:lnB>
+                  </a:tcPr>
+                </a:tc>
+                <a:tc>
+                  <a:txBody>
+                    <a:bodyPr/>
+                    <a:lstStyle/>
+                    <a:p>
+                      <a:r>
+                        <a:rPr lang="en-US" sz="1200" dirty="0" smtClean="0"/>
+                        <a:t>Sasha checks and discuss 2.2.4 (LCA)</a:t>
+                      </a:r>
+                    </a:p>
+                    <a:p>
+                      <a:r>
+                        <a:rPr lang="en-US" sz="1200" dirty="0" smtClean="0"/>
+                        <a:t>Sasha </a:t>
+                      </a:r>
+                      <a:r>
+                        <a:rPr lang="en-US" sz="1200" dirty="0" smtClean="0"/>
+                        <a:t>checks 2.2.5</a:t>
+                      </a:r>
+                      <a:endParaRPr lang="en-US" sz="1200" dirty="0"/>
+                    </a:p>
+                  </a:txBody>
+                  <a:tcPr>
+                    <a:lnB w="12700" cmpd="sng">
+                      <a:noFill/>
+                    </a:lnB>
+                  </a:tcPr>
+                </a:tc>
+                <a:extLst>
+                  <a:ext uri="{0D108BD9-81ED-4DB2-BD59-A6C34878D82A}">
+                    <a16:rowId xmlns:a16="http://schemas.microsoft.com/office/drawing/2014/main" val="3783486380"/>
+                  </a:ext>
+                </a:extLst>
+              </a:tr>
+              <a:tr h="268218">
+                <a:tc>
+                  <a:txBody>
+                    <a:bodyPr/>
+                    <a:lstStyle/>
+                    <a:p>
+                      <a:r>
+                        <a:rPr lang="en-US" sz="1200" dirty="0" smtClean="0"/>
+                        <a:t>3 Dec</a:t>
+                      </a:r>
+                      <a:endParaRPr lang="en-US" sz="1200" dirty="0"/>
+                    </a:p>
+                  </a:txBody>
+                  <a:tcPr>
+                    <a:lnL w="12700" cmpd="sng">
+                      <a:noFill/>
+                    </a:lnL>
+                    <a:lnR w="12700" cmpd="sng">
+                      <a:noFill/>
+                    </a:lnR>
+                    <a:lnT w="12700" cmpd="sng">
+                      <a:noFill/>
+                    </a:lnT>
+                    <a:lnB w="12700" cap="flat" cmpd="sng" algn="ctr">
+                      <a:noFill/>
+                      <a:prstDash val="solid"/>
+                      <a:round/>
+                      <a:headEnd type="none" w="med" len="med"/>
+                      <a:tailEnd type="none" w="med" len="med"/>
+                    </a:lnB>
+                    <a:lnTlToBr w="12700" cmpd="sng">
+                      <a:noFill/>
+                      <a:prstDash val="solid"/>
+                    </a:lnTlToBr>
+                    <a:lnBlToTr w="12700" cmpd="sng">
+                      <a:noFill/>
+                      <a:prstDash val="solid"/>
+                    </a:lnBlToTr>
                   </a:tcPr>
                 </a:tc>
                 <a:tc>
@@ -5929,11 +6275,11 @@
                         <a:defRPr/>
                       </a:pPr>
                       <a:r>
-                        <a:rPr lang="en-US" sz="1400" dirty="0" smtClean="0"/>
+                        <a:rPr lang="en-US" sz="1200" dirty="0" smtClean="0"/>
                         <a:t>(re) Write</a:t>
                       </a:r>
                       <a:r>
-                        <a:rPr lang="en-US" sz="1400" baseline="0" dirty="0" smtClean="0"/>
+                        <a:rPr lang="en-US" sz="1200" baseline="0" dirty="0" smtClean="0"/>
                         <a:t> Section 2.3. Case study (and Table 5)</a:t>
                       </a:r>
                     </a:p>
@@ -5943,16 +6289,37 @@
                         <a:buChar char="-"/>
                       </a:pPr>
                       <a:r>
-                        <a:rPr lang="en-US" sz="1400" baseline="0" dirty="0" smtClean="0"/>
+                        <a:rPr lang="en-US" sz="1200" baseline="0" dirty="0" smtClean="0"/>
                         <a:t>Write Section 2 Methodology intro </a:t>
                       </a:r>
-                      <a:endParaRPr lang="en-US" sz="1400" baseline="0" dirty="0"/>
+                      <a:endParaRPr lang="en-US" sz="1200" baseline="0" dirty="0"/>
                     </a:p>
                   </a:txBody>
                   <a:tcPr>
-                    <a:lnB w="12700" cmpd="sng">
-                      <a:noFill/>
+                    <a:lnL w="12700" cmpd="sng">
+                      <a:noFill/>
+                    </a:lnL>
+                    <a:lnR w="12700" cmpd="sng">
+                      <a:noFill/>
+                    </a:lnR>
+                    <a:lnT w="12700" cmpd="sng">
+                      <a:noFill/>
+                    </a:lnT>
+                    <a:lnB w="12700" cap="flat" cmpd="sng" algn="ctr">
+                      <a:noFill/>
+                      <a:prstDash val="solid"/>
+                      <a:round/>
+                      <a:headEnd type="none" w="med" len="med"/>
+                      <a:tailEnd type="none" w="med" len="med"/>
                     </a:lnB>
+                    <a:lnTlToBr w="12700" cmpd="sng">
+                      <a:noFill/>
+                      <a:prstDash val="solid"/>
+                    </a:lnTlToBr>
+                    <a:lnBlToTr w="12700" cmpd="sng">
+                      <a:noFill/>
+                      <a:prstDash val="solid"/>
+                    </a:lnBlToTr>
                   </a:tcPr>
                 </a:tc>
                 <a:tc>
@@ -5961,46 +6328,21 @@
                     <a:lstStyle/>
                     <a:p>
                       <a:r>
-                        <a:rPr lang="en-US" sz="1400" dirty="0" smtClean="0"/>
+                        <a:rPr lang="en-US" sz="1200" dirty="0" smtClean="0"/>
                         <a:t>Sasha checks</a:t>
                       </a:r>
                       <a:r>
-                        <a:rPr lang="en-US" sz="1400" baseline="0" dirty="0" smtClean="0"/>
+                        <a:rPr lang="en-US" sz="1200" baseline="0" dirty="0" smtClean="0"/>
                         <a:t> 2.3. + Section 2 intro</a:t>
                       </a:r>
-                      <a:endParaRPr lang="en-US" sz="1400" dirty="0" smtClean="0"/>
+                      <a:endParaRPr lang="en-US" sz="1200" dirty="0" smtClean="0"/>
                     </a:p>
                     <a:p>
                       <a:r>
-                        <a:rPr lang="en-US" sz="1400" dirty="0" smtClean="0"/>
+                        <a:rPr lang="en-US" sz="1200" dirty="0" smtClean="0"/>
                         <a:t>Work and review together </a:t>
                       </a:r>
-                      <a:endParaRPr lang="en-US" sz="1400" dirty="0"/>
-                    </a:p>
-                  </a:txBody>
-                  <a:tcPr>
-                    <a:lnB w="12700" cmpd="sng">
-                      <a:noFill/>
-                    </a:lnB>
-                  </a:tcPr>
-                </a:tc>
-                <a:extLst>
-                  <a:ext uri="{0D108BD9-81ED-4DB2-BD59-A6C34878D82A}">
-                    <a16:rowId xmlns:a16="http://schemas.microsoft.com/office/drawing/2014/main" val="3783486380"/>
-                  </a:ext>
-                </a:extLst>
-              </a:tr>
-              <a:tr h="268218">
-                <a:tc>
-                  <a:txBody>
-                    <a:bodyPr/>
-                    <a:lstStyle/>
-                    <a:p>
-                      <a:r>
-                        <a:rPr lang="en-US" sz="1400" dirty="0" smtClean="0"/>
-                        <a:t>3 Dec</a:t>
-                      </a:r>
-                      <a:endParaRPr lang="en-US" sz="1400" dirty="0"/>
+                      <a:endParaRPr lang="en-US" sz="1200" dirty="0"/>
                     </a:p>
                   </a:txBody>
                   <a:tcPr>
@@ -6028,6 +6370,44 @@
                       <a:noFill/>
                       <a:prstDash val="solid"/>
                     </a:lnBlToTr>
+                  </a:tcPr>
+                </a:tc>
+                <a:extLst>
+                  <a:ext uri="{0D108BD9-81ED-4DB2-BD59-A6C34878D82A}">
+                    <a16:rowId xmlns:a16="http://schemas.microsoft.com/office/drawing/2014/main" val="4034592237"/>
+                  </a:ext>
+                </a:extLst>
+              </a:tr>
+              <a:tr h="370840">
+                <a:tc>
+                  <a:txBody>
+                    <a:bodyPr/>
+                    <a:lstStyle/>
+                    <a:p>
+                      <a:r>
+                        <a:rPr lang="en-US" sz="1200" dirty="0" smtClean="0"/>
+                        <a:t>4 Dec</a:t>
+                      </a:r>
+                      <a:endParaRPr lang="en-US" sz="1200" dirty="0"/>
+                    </a:p>
+                  </a:txBody>
+                  <a:tcPr>
+                    <a:lnT w="12700" cap="flat" cmpd="sng" algn="ctr">
+                      <a:noFill/>
+                      <a:prstDash val="solid"/>
+                      <a:round/>
+                      <a:headEnd type="none" w="med" len="med"/>
+                      <a:tailEnd type="none" w="med" len="med"/>
+                    </a:lnT>
+                    <a:lnB w="12700" cap="flat" cmpd="sng" algn="ctr">
+                      <a:solidFill>
+                        <a:schemeClr val="tx1"/>
+                      </a:solidFill>
+                      <a:prstDash val="solid"/>
+                      <a:round/>
+                      <a:headEnd type="none" w="med" len="med"/>
+                      <a:tailEnd type="none" w="med" len="med"/>
+                    </a:lnB>
                   </a:tcPr>
                 </a:tc>
                 <a:tc>
@@ -6053,95 +6433,10 @@
                         <a:defRPr/>
                       </a:pPr>
                       <a:r>
-                        <a:rPr lang="en-US" sz="1400" baseline="0" dirty="0" smtClean="0"/>
+                        <a:rPr lang="en-US" sz="1200" baseline="0" dirty="0" smtClean="0"/>
                         <a:t>Complete Section check </a:t>
                       </a:r>
-                      <a:endParaRPr lang="en-US" sz="1400" dirty="0"/>
-                    </a:p>
-                  </a:txBody>
-                  <a:tcPr>
-                    <a:lnL w="12700" cmpd="sng">
-                      <a:noFill/>
-                    </a:lnL>
-                    <a:lnR w="12700" cmpd="sng">
-                      <a:noFill/>
-                    </a:lnR>
-                    <a:lnT w="12700" cmpd="sng">
-                      <a:noFill/>
-                    </a:lnT>
-                    <a:lnB w="12700" cap="flat" cmpd="sng" algn="ctr">
-                      <a:noFill/>
-                      <a:prstDash val="solid"/>
-                      <a:round/>
-                      <a:headEnd type="none" w="med" len="med"/>
-                      <a:tailEnd type="none" w="med" len="med"/>
-                    </a:lnB>
-                    <a:lnTlToBr w="12700" cmpd="sng">
-                      <a:noFill/>
-                      <a:prstDash val="solid"/>
-                    </a:lnTlToBr>
-                    <a:lnBlToTr w="12700" cmpd="sng">
-                      <a:noFill/>
-                      <a:prstDash val="solid"/>
-                    </a:lnBlToTr>
-                  </a:tcPr>
-                </a:tc>
-                <a:tc>
-                  <a:txBody>
-                    <a:bodyPr/>
-                    <a:lstStyle/>
-                    <a:p>
-                      <a:r>
-                        <a:rPr lang="en-US" sz="1400" dirty="0" smtClean="0"/>
-                        <a:t>Send the draft to Steffi on Section 2</a:t>
-                      </a:r>
-                      <a:endParaRPr lang="en-US" sz="1400" dirty="0"/>
-                    </a:p>
-                  </a:txBody>
-                  <a:tcPr>
-                    <a:lnL w="12700" cmpd="sng">
-                      <a:noFill/>
-                    </a:lnL>
-                    <a:lnR w="12700" cmpd="sng">
-                      <a:noFill/>
-                    </a:lnR>
-                    <a:lnT w="12700" cmpd="sng">
-                      <a:noFill/>
-                    </a:lnT>
-                    <a:lnB w="12700" cap="flat" cmpd="sng" algn="ctr">
-                      <a:noFill/>
-                      <a:prstDash val="solid"/>
-                      <a:round/>
-                      <a:headEnd type="none" w="med" len="med"/>
-                      <a:tailEnd type="none" w="med" len="med"/>
-                    </a:lnB>
-                    <a:lnTlToBr w="12700" cmpd="sng">
-                      <a:noFill/>
-                      <a:prstDash val="solid"/>
-                    </a:lnTlToBr>
-                    <a:lnBlToTr w="12700" cmpd="sng">
-                      <a:noFill/>
-                      <a:prstDash val="solid"/>
-                    </a:lnBlToTr>
-                  </a:tcPr>
-                </a:tc>
-                <a:extLst>
-                  <a:ext uri="{0D108BD9-81ED-4DB2-BD59-A6C34878D82A}">
-                    <a16:rowId xmlns:a16="http://schemas.microsoft.com/office/drawing/2014/main" val="4034592237"/>
-                  </a:ext>
-                </a:extLst>
-              </a:tr>
-              <a:tr h="370840">
-                <a:tc>
-                  <a:txBody>
-                    <a:bodyPr/>
-                    <a:lstStyle/>
-                    <a:p>
-                      <a:r>
-                        <a:rPr lang="en-US" sz="1400" dirty="0" smtClean="0"/>
-                        <a:t>4 Dec</a:t>
-                      </a:r>
-                      <a:endParaRPr lang="en-US" sz="1400" dirty="0"/>
+                      <a:endParaRPr lang="en-US" sz="1200" dirty="0"/>
                     </a:p>
                   </a:txBody>
                   <a:tcPr>
@@ -6169,37 +6464,10 @@
                     <a:lstStyle/>
                     <a:p>
                       <a:r>
-                        <a:rPr lang="en-US" sz="1400" dirty="0" smtClean="0"/>
-                        <a:t>BUFFER</a:t>
-                      </a:r>
-                      <a:endParaRPr lang="en-US" sz="1400" dirty="0"/>
-                    </a:p>
-                  </a:txBody>
-                  <a:tcPr>
-                    <a:lnT w="12700" cap="flat" cmpd="sng" algn="ctr">
-                      <a:noFill/>
-                      <a:prstDash val="solid"/>
-                      <a:round/>
-                      <a:headEnd type="none" w="med" len="med"/>
-                      <a:tailEnd type="none" w="med" len="med"/>
-                    </a:lnT>
-                    <a:lnB w="12700" cap="flat" cmpd="sng" algn="ctr">
-                      <a:solidFill>
-                        <a:schemeClr val="tx1"/>
-                      </a:solidFill>
-                      <a:prstDash val="solid"/>
-                      <a:round/>
-                      <a:headEnd type="none" w="med" len="med"/>
-                      <a:tailEnd type="none" w="med" len="med"/>
-                    </a:lnB>
-                  </a:tcPr>
-                </a:tc>
-                <a:tc>
-                  <a:txBody>
-                    <a:bodyPr/>
-                    <a:lstStyle/>
-                    <a:p>
-                      <a:endParaRPr lang="en-US" sz="1400" dirty="0"/>
+                        <a:rPr lang="en-US" sz="1200" dirty="0" smtClean="0"/>
+                        <a:t>Send the draft to Steffi on Section 2</a:t>
+                      </a:r>
+                      <a:endParaRPr lang="en-US" sz="1200" dirty="0"/>
                     </a:p>
                   </a:txBody>
                   <a:tcPr>
@@ -6234,10 +6502,10 @@
                     <a:lstStyle/>
                     <a:p>
                       <a:r>
-                        <a:rPr lang="en-US" sz="1400" dirty="0" smtClean="0"/>
+                        <a:rPr lang="en-US" sz="1200" dirty="0" smtClean="0"/>
                         <a:t>5 Dec</a:t>
                       </a:r>
-                      <a:endParaRPr lang="en-US" sz="1400" dirty="0"/>
+                      <a:endParaRPr lang="en-US" sz="1200" dirty="0"/>
                     </a:p>
                   </a:txBody>
                   <a:tcPr>
@@ -6260,7 +6528,7 @@
                     <a:bodyPr/>
                     <a:lstStyle/>
                     <a:p>
-                      <a:endParaRPr lang="en-US" sz="1400" dirty="0"/>
+                      <a:endParaRPr lang="en-US" sz="1200" dirty="0"/>
                     </a:p>
                   </a:txBody>
                   <a:tcPr>
@@ -6284,10 +6552,10 @@
                     <a:lstStyle/>
                     <a:p>
                       <a:r>
-                        <a:rPr lang="en-US" sz="1400" dirty="0" smtClean="0"/>
+                        <a:rPr lang="en-US" sz="1200" dirty="0" smtClean="0"/>
                         <a:t>Discussion (SSR): Section 2</a:t>
                       </a:r>
-                      <a:endParaRPr lang="en-US" sz="1400" dirty="0"/>
+                      <a:endParaRPr lang="en-US" sz="1200" dirty="0"/>
                     </a:p>
                   </a:txBody>
                   <a:tcPr>
@@ -6318,10 +6586,10 @@
                     <a:lstStyle/>
                     <a:p>
                       <a:r>
-                        <a:rPr lang="en-US" sz="1400" dirty="0" smtClean="0"/>
+                        <a:rPr lang="en-US" sz="1200" dirty="0" smtClean="0"/>
                         <a:t>6 Dec</a:t>
                       </a:r>
-                      <a:endParaRPr lang="en-US" sz="1400" dirty="0"/>
+                      <a:endParaRPr lang="en-US" sz="1200" dirty="0"/>
                     </a:p>
                   </a:txBody>
                   <a:tcPr>
@@ -6356,7 +6624,7 @@
                     <a:bodyPr/>
                     <a:lstStyle/>
                     <a:p>
-                      <a:endParaRPr lang="en-US" sz="1400" dirty="0"/>
+                      <a:endParaRPr lang="en-US" sz="1200" dirty="0"/>
                     </a:p>
                   </a:txBody>
                   <a:tcPr>
@@ -6391,7 +6659,7 @@
                     <a:bodyPr/>
                     <a:lstStyle/>
                     <a:p>
-                      <a:endParaRPr lang="en-US" sz="1400" dirty="0"/>
+                      <a:endParaRPr lang="en-US" sz="1200" dirty="0"/>
                     </a:p>
                   </a:txBody>
                   <a:tcPr>
@@ -6434,10 +6702,10 @@
                     <a:lstStyle/>
                     <a:p>
                       <a:r>
-                        <a:rPr lang="en-US" sz="1400" dirty="0" smtClean="0"/>
+                        <a:rPr lang="en-US" sz="1200" dirty="0" smtClean="0"/>
                         <a:t>7 Dec</a:t>
                       </a:r>
-                      <a:endParaRPr lang="en-US" sz="1400" dirty="0"/>
+                      <a:endParaRPr lang="en-US" sz="1200" dirty="0"/>
                     </a:p>
                   </a:txBody>
                   <a:tcPr>
@@ -6472,7 +6740,7 @@
                     <a:bodyPr/>
                     <a:lstStyle/>
                     <a:p>
-                      <a:endParaRPr lang="en-US" sz="1400" dirty="0"/>
+                      <a:endParaRPr lang="en-US" sz="1200" dirty="0"/>
                     </a:p>
                   </a:txBody>
                   <a:tcPr>
@@ -6507,7 +6775,7 @@
                     <a:bodyPr/>
                     <a:lstStyle/>
                     <a:p>
-                      <a:endParaRPr lang="en-US" sz="1400" dirty="0"/>
+                      <a:endParaRPr lang="en-US" sz="1200" dirty="0"/>
                     </a:p>
                   </a:txBody>
                   <a:tcPr>
@@ -6550,10 +6818,10 @@
                     <a:lstStyle/>
                     <a:p>
                       <a:r>
-                        <a:rPr lang="en-US" sz="1400" dirty="0" smtClean="0"/>
+                        <a:rPr lang="en-US" sz="1200" dirty="0" smtClean="0"/>
                         <a:t>8 Dec</a:t>
                       </a:r>
-                      <a:endParaRPr lang="en-US" sz="1400" dirty="0"/>
+                      <a:endParaRPr lang="en-US" sz="1200" dirty="0"/>
                     </a:p>
                   </a:txBody>
                   <a:tcPr>
@@ -6588,7 +6856,7 @@
                     <a:bodyPr/>
                     <a:lstStyle/>
                     <a:p>
-                      <a:endParaRPr lang="en-US" sz="1400" dirty="0"/>
+                      <a:endParaRPr lang="en-US" sz="1200" dirty="0"/>
                     </a:p>
                   </a:txBody>
                   <a:tcPr>
@@ -6623,7 +6891,7 @@
                     <a:bodyPr/>
                     <a:lstStyle/>
                     <a:p>
-                      <a:endParaRPr lang="en-US" sz="1400" dirty="0"/>
+                      <a:endParaRPr lang="en-US" sz="1200" dirty="0"/>
                     </a:p>
                   </a:txBody>
                   <a:tcPr>
@@ -6666,10 +6934,10 @@
                     <a:lstStyle/>
                     <a:p>
                       <a:r>
-                        <a:rPr lang="en-US" sz="1400" dirty="0" smtClean="0"/>
+                        <a:rPr lang="en-US" sz="1200" dirty="0" smtClean="0"/>
                         <a:t>9 Dec</a:t>
                       </a:r>
-                      <a:endParaRPr lang="en-US" sz="1400" dirty="0"/>
+                      <a:endParaRPr lang="en-US" sz="1200" dirty="0"/>
                     </a:p>
                   </a:txBody>
                   <a:tcPr>
@@ -6704,7 +6972,7 @@
                     <a:bodyPr/>
                     <a:lstStyle/>
                     <a:p>
-                      <a:endParaRPr lang="en-US" sz="1400" dirty="0"/>
+                      <a:endParaRPr lang="en-US" sz="1200" dirty="0"/>
                     </a:p>
                   </a:txBody>
                   <a:tcPr>
@@ -6739,7 +7007,7 @@
                     <a:bodyPr/>
                     <a:lstStyle/>
                     <a:p>
-                      <a:endParaRPr lang="en-US" sz="1400" dirty="0"/>
+                      <a:endParaRPr lang="en-US" sz="1200" dirty="0"/>
                     </a:p>
                   </a:txBody>
                   <a:tcPr>
@@ -6782,10 +7050,10 @@
                     <a:lstStyle/>
                     <a:p>
                       <a:r>
-                        <a:rPr lang="en-US" sz="1400" dirty="0" smtClean="0"/>
+                        <a:rPr lang="en-US" sz="1200" dirty="0" smtClean="0"/>
                         <a:t>10 Dec</a:t>
                       </a:r>
-                      <a:endParaRPr lang="en-US" sz="1400" dirty="0"/>
+                      <a:endParaRPr lang="en-US" sz="1200" dirty="0"/>
                     </a:p>
                   </a:txBody>
                   <a:tcPr>
@@ -6822,7 +7090,7 @@
                     <a:bodyPr/>
                     <a:lstStyle/>
                     <a:p>
-                      <a:endParaRPr lang="en-US" sz="1400" dirty="0"/>
+                      <a:endParaRPr lang="en-US" sz="1200" dirty="0"/>
                     </a:p>
                   </a:txBody>
                   <a:tcPr>
@@ -6859,7 +7127,7 @@
                     <a:bodyPr/>
                     <a:lstStyle/>
                     <a:p>
-                      <a:endParaRPr lang="en-US" sz="1400" dirty="0"/>
+                      <a:endParaRPr lang="en-US" sz="1200" dirty="0"/>
                     </a:p>
                   </a:txBody>
                   <a:tcPr>
@@ -6970,7 +7238,7 @@
           <a:p>
             <a:fld id="{FF15E650-2C9B-4E22-B544-79A90AB3DDC1}" type="datetime1">
               <a:rPr lang="de-DE" smtClean="0"/>
-              <a:t>27.11.2022</a:t>
+              <a:t>29.11.2022</a:t>
             </a:fld>
             <a:endParaRPr lang="de-DE"/>
           </a:p>
@@ -7150,7 +7418,7 @@
           <a:p>
             <a:fld id="{FF15E650-2C9B-4E22-B544-79A90AB3DDC1}" type="datetime1">
               <a:rPr lang="de-DE" smtClean="0"/>
-              <a:t>27.11.2022</a:t>
+              <a:t>29.11.2022</a:t>
             </a:fld>
             <a:endParaRPr lang="de-DE"/>
           </a:p>
@@ -7316,7 +7584,7 @@
           <a:p>
             <a:fld id="{FF15E650-2C9B-4E22-B544-79A90AB3DDC1}" type="datetime1">
               <a:rPr lang="de-DE" smtClean="0"/>
-              <a:t>27.11.2022</a:t>
+              <a:t>29.11.2022</a:t>
             </a:fld>
             <a:endParaRPr lang="de-DE"/>
           </a:p>
@@ -7545,7 +7813,7 @@
           <a:p>
             <a:fld id="{FF15E650-2C9B-4E22-B544-79A90AB3DDC1}" type="datetime1">
               <a:rPr lang="de-DE" smtClean="0"/>
-              <a:t>27.11.2022</a:t>
+              <a:t>29.11.2022</a:t>
             </a:fld>
             <a:endParaRPr lang="de-DE"/>
           </a:p>
@@ -7891,7 +8159,7 @@
           <a:p>
             <a:fld id="{FF15E650-2C9B-4E22-B544-79A90AB3DDC1}" type="datetime1">
               <a:rPr lang="de-DE" smtClean="0"/>
-              <a:t>27.11.2022</a:t>
+              <a:t>29.11.2022</a:t>
             </a:fld>
             <a:endParaRPr lang="de-DE"/>
           </a:p>
@@ -8068,7 +8336,7 @@
           <a:p>
             <a:fld id="{FF15E650-2C9B-4E22-B544-79A90AB3DDC1}" type="datetime1">
               <a:rPr lang="de-DE" smtClean="0"/>
-              <a:t>27.11.2022</a:t>
+              <a:t>29.11.2022</a:t>
             </a:fld>
             <a:endParaRPr lang="de-DE"/>
           </a:p>

</xml_diff>